<commit_message>
Creacion y actualizacion de Productos
</commit_message>
<xml_diff>
--- a/DeamonBox.pptx
+++ b/DeamonBox.pptx
@@ -223,7 +223,7 @@
           <a:p>
             <a:fld id="{E855114A-9F15-46A2-A83C-1C7B26F270F1}" type="datetimeFigureOut">
               <a:rPr lang="es-419" smtClean="0"/>
-              <a:t>21/3/2022</a:t>
+              <a:t>22/3/2022</a:t>
             </a:fld>
             <a:endParaRPr lang="es-419"/>
           </a:p>
@@ -400,7 +400,7 @@
           <a:p>
             <a:fld id="{A57C991D-5123-4467-A16D-076E9CB41B4A}" type="datetimeFigureOut">
               <a:rPr lang="es-419" smtClean="0"/>
-              <a:t>21/3/2022</a:t>
+              <a:t>22/3/2022</a:t>
             </a:fld>
             <a:endParaRPr lang="es-419"/>
           </a:p>
@@ -909,7 +909,7 @@
           <a:p>
             <a:fld id="{687B1421-9C9E-4715-BD7C-C860B6ECD111}" type="datetimeFigureOut">
               <a:rPr lang="es-419" smtClean="0"/>
-              <a:t>21/3/2022</a:t>
+              <a:t>22/3/2022</a:t>
             </a:fld>
             <a:endParaRPr lang="es-419"/>
           </a:p>
@@ -1119,7 +1119,7 @@
           <a:p>
             <a:fld id="{687B1421-9C9E-4715-BD7C-C860B6ECD111}" type="datetimeFigureOut">
               <a:rPr lang="es-419" smtClean="0"/>
-              <a:t>21/3/2022</a:t>
+              <a:t>22/3/2022</a:t>
             </a:fld>
             <a:endParaRPr lang="es-419"/>
           </a:p>
@@ -1232,7 +1232,7 @@
           <a:p>
             <a:fld id="{687B1421-9C9E-4715-BD7C-C860B6ECD111}" type="datetimeFigureOut">
               <a:rPr lang="es-419" smtClean="0"/>
-              <a:t>21/3/2022</a:t>
+              <a:t>22/3/2022</a:t>
             </a:fld>
             <a:endParaRPr lang="es-419"/>
           </a:p>
@@ -1641,7 +1641,7 @@
           <a:p>
             <a:fld id="{687B1421-9C9E-4715-BD7C-C860B6ECD111}" type="datetimeFigureOut">
               <a:rPr lang="es-419" smtClean="0"/>
-              <a:t>21/3/2022</a:t>
+              <a:t>22/3/2022</a:t>
             </a:fld>
             <a:endParaRPr lang="es-419"/>
           </a:p>
@@ -1909,7 +1909,7 @@
           <a:p>
             <a:fld id="{687B1421-9C9E-4715-BD7C-C860B6ECD111}" type="datetimeFigureOut">
               <a:rPr lang="es-419" smtClean="0"/>
-              <a:t>21/3/2022</a:t>
+              <a:t>22/3/2022</a:t>
             </a:fld>
             <a:endParaRPr lang="es-419"/>
           </a:p>
@@ -2324,7 +2324,7 @@
           <a:p>
             <a:fld id="{687B1421-9C9E-4715-BD7C-C860B6ECD111}" type="datetimeFigureOut">
               <a:rPr lang="es-419" smtClean="0"/>
-              <a:t>21/3/2022</a:t>
+              <a:t>22/3/2022</a:t>
             </a:fld>
             <a:endParaRPr lang="es-419"/>
           </a:p>
@@ -2466,7 +2466,7 @@
           <a:p>
             <a:fld id="{687B1421-9C9E-4715-BD7C-C860B6ECD111}" type="datetimeFigureOut">
               <a:rPr lang="es-419" smtClean="0"/>
-              <a:t>21/3/2022</a:t>
+              <a:t>22/3/2022</a:t>
             </a:fld>
             <a:endParaRPr lang="es-419"/>
           </a:p>
@@ -2579,7 +2579,7 @@
           <a:p>
             <a:fld id="{687B1421-9C9E-4715-BD7C-C860B6ECD111}" type="datetimeFigureOut">
               <a:rPr lang="es-419" smtClean="0"/>
-              <a:t>21/3/2022</a:t>
+              <a:t>22/3/2022</a:t>
             </a:fld>
             <a:endParaRPr lang="es-419"/>
           </a:p>
@@ -2892,7 +2892,7 @@
           <a:p>
             <a:fld id="{687B1421-9C9E-4715-BD7C-C860B6ECD111}" type="datetimeFigureOut">
               <a:rPr lang="es-419" smtClean="0"/>
-              <a:t>21/3/2022</a:t>
+              <a:t>22/3/2022</a:t>
             </a:fld>
             <a:endParaRPr lang="es-419"/>
           </a:p>
@@ -3181,7 +3181,7 @@
           <a:p>
             <a:fld id="{687B1421-9C9E-4715-BD7C-C860B6ECD111}" type="datetimeFigureOut">
               <a:rPr lang="es-419" smtClean="0"/>
-              <a:t>21/3/2022</a:t>
+              <a:t>22/3/2022</a:t>
             </a:fld>
             <a:endParaRPr lang="es-419"/>
           </a:p>
@@ -3424,7 +3424,7 @@
           <a:p>
             <a:fld id="{687B1421-9C9E-4715-BD7C-C860B6ECD111}" type="datetimeFigureOut">
               <a:rPr lang="es-419" smtClean="0"/>
-              <a:t>21/3/2022</a:t>
+              <a:t>22/3/2022</a:t>
             </a:fld>
             <a:endParaRPr lang="es-419"/>
           </a:p>
@@ -5131,69 +5131,7 @@
                 </a:solidFill>
                 <a:latin typeface="Copperplate Gothic Bold" panose="020E0705020206020404" pitchFamily="34" charset="0"/>
               </a:rPr>
-              <a:t>Consultar Producto</a:t>
-            </a:r>
-          </a:p>
-        </p:txBody>
-      </p:sp>
-      <p:sp>
-        <p:nvSpPr>
-          <p:cNvPr id="5" name="Rectángulo: esquinas redondeadas 4">
-            <a:extLst>
-              <a:ext uri="{FF2B5EF4-FFF2-40B4-BE49-F238E27FC236}">
-                <a16:creationId xmlns:a16="http://schemas.microsoft.com/office/drawing/2014/main" id="{57F1357B-541F-460D-93C4-F7A3902101AD}"/>
-              </a:ext>
-            </a:extLst>
-          </p:cNvPr>
-          <p:cNvSpPr/>
-          <p:nvPr/>
-        </p:nvSpPr>
-        <p:spPr>
-          <a:xfrm>
-            <a:off x="-3" y="4362450"/>
-            <a:ext cx="2733675" cy="523786"/>
-          </a:xfrm>
-          <a:prstGeom prst="roundRect">
-            <a:avLst>
-              <a:gd name="adj" fmla="val 0"/>
-            </a:avLst>
-          </a:prstGeom>
-          <a:noFill/>
-          <a:ln>
-            <a:solidFill>
-              <a:srgbClr val="595948"/>
-            </a:solidFill>
-          </a:ln>
-        </p:spPr>
-        <p:style>
-          <a:lnRef idx="2">
-            <a:schemeClr val="accent1">
-              <a:shade val="50000"/>
-            </a:schemeClr>
-          </a:lnRef>
-          <a:fillRef idx="1">
-            <a:schemeClr val="accent1"/>
-          </a:fillRef>
-          <a:effectRef idx="0">
-            <a:schemeClr val="accent1"/>
-          </a:effectRef>
-          <a:fontRef idx="minor">
-            <a:schemeClr val="lt1"/>
-          </a:fontRef>
-        </p:style>
-        <p:txBody>
-          <a:bodyPr rtlCol="0" anchor="ctr"/>
-          <a:lstStyle/>
-          <a:p>
-            <a:pPr algn="ctr"/>
-            <a:r>
-              <a:rPr lang="es-419" sz="1600" dirty="0">
-                <a:solidFill>
-                  <a:srgbClr val="595948"/>
-                </a:solidFill>
-                <a:latin typeface="Copperplate Gothic Bold" panose="020E0705020206020404" pitchFamily="34" charset="0"/>
-              </a:rPr>
-              <a:t>Consultar Material</a:t>
+              <a:t>Consultar Objeto</a:t>
             </a:r>
           </a:p>
         </p:txBody>
@@ -6878,69 +6816,7 @@
                 </a:solidFill>
                 <a:latin typeface="Copperplate Gothic Bold" panose="020E0705020206020404" pitchFamily="34" charset="0"/>
               </a:rPr>
-              <a:t>Consultar Producto</a:t>
-            </a:r>
-          </a:p>
-        </p:txBody>
-      </p:sp>
-      <p:sp>
-        <p:nvSpPr>
-          <p:cNvPr id="5" name="Rectángulo: esquinas redondeadas 4">
-            <a:extLst>
-              <a:ext uri="{FF2B5EF4-FFF2-40B4-BE49-F238E27FC236}">
-                <a16:creationId xmlns:a16="http://schemas.microsoft.com/office/drawing/2014/main" id="{186543CC-FD38-446A-BE03-F1F8902C35FA}"/>
-              </a:ext>
-            </a:extLst>
-          </p:cNvPr>
-          <p:cNvSpPr/>
-          <p:nvPr/>
-        </p:nvSpPr>
-        <p:spPr>
-          <a:xfrm>
-            <a:off x="-3" y="4362450"/>
-            <a:ext cx="2733675" cy="523786"/>
-          </a:xfrm>
-          <a:prstGeom prst="roundRect">
-            <a:avLst>
-              <a:gd name="adj" fmla="val 0"/>
-            </a:avLst>
-          </a:prstGeom>
-          <a:noFill/>
-          <a:ln>
-            <a:solidFill>
-              <a:srgbClr val="595948"/>
-            </a:solidFill>
-          </a:ln>
-        </p:spPr>
-        <p:style>
-          <a:lnRef idx="2">
-            <a:schemeClr val="accent1">
-              <a:shade val="50000"/>
-            </a:schemeClr>
-          </a:lnRef>
-          <a:fillRef idx="1">
-            <a:schemeClr val="accent1"/>
-          </a:fillRef>
-          <a:effectRef idx="0">
-            <a:schemeClr val="accent1"/>
-          </a:effectRef>
-          <a:fontRef idx="minor">
-            <a:schemeClr val="lt1"/>
-          </a:fontRef>
-        </p:style>
-        <p:txBody>
-          <a:bodyPr rtlCol="0" anchor="ctr"/>
-          <a:lstStyle/>
-          <a:p>
-            <a:pPr algn="ctr"/>
-            <a:r>
-              <a:rPr lang="es-419" sz="1600" dirty="0">
-                <a:solidFill>
-                  <a:srgbClr val="595948"/>
-                </a:solidFill>
-                <a:latin typeface="Copperplate Gothic Bold" panose="020E0705020206020404" pitchFamily="34" charset="0"/>
-              </a:rPr>
-              <a:t>Consultar Material</a:t>
+              <a:t>Consultar Objeto</a:t>
             </a:r>
           </a:p>
         </p:txBody>
@@ -9273,69 +9149,7 @@
                 </a:solidFill>
                 <a:latin typeface="Copperplate Gothic Bold" panose="020E0705020206020404" pitchFamily="34" charset="0"/>
               </a:rPr>
-              <a:t>Consultar Producto</a:t>
-            </a:r>
-          </a:p>
-        </p:txBody>
-      </p:sp>
-      <p:sp>
-        <p:nvSpPr>
-          <p:cNvPr id="5" name="Rectángulo: esquinas redondeadas 4">
-            <a:extLst>
-              <a:ext uri="{FF2B5EF4-FFF2-40B4-BE49-F238E27FC236}">
-                <a16:creationId xmlns:a16="http://schemas.microsoft.com/office/drawing/2014/main" id="{186543CC-FD38-446A-BE03-F1F8902C35FA}"/>
-              </a:ext>
-            </a:extLst>
-          </p:cNvPr>
-          <p:cNvSpPr/>
-          <p:nvPr/>
-        </p:nvSpPr>
-        <p:spPr>
-          <a:xfrm>
-            <a:off x="-3" y="4362450"/>
-            <a:ext cx="2733675" cy="523786"/>
-          </a:xfrm>
-          <a:prstGeom prst="roundRect">
-            <a:avLst>
-              <a:gd name="adj" fmla="val 0"/>
-            </a:avLst>
-          </a:prstGeom>
-          <a:noFill/>
-          <a:ln>
-            <a:solidFill>
-              <a:srgbClr val="595948"/>
-            </a:solidFill>
-          </a:ln>
-        </p:spPr>
-        <p:style>
-          <a:lnRef idx="2">
-            <a:schemeClr val="accent1">
-              <a:shade val="50000"/>
-            </a:schemeClr>
-          </a:lnRef>
-          <a:fillRef idx="1">
-            <a:schemeClr val="accent1"/>
-          </a:fillRef>
-          <a:effectRef idx="0">
-            <a:schemeClr val="accent1"/>
-          </a:effectRef>
-          <a:fontRef idx="minor">
-            <a:schemeClr val="lt1"/>
-          </a:fontRef>
-        </p:style>
-        <p:txBody>
-          <a:bodyPr rtlCol="0" anchor="ctr"/>
-          <a:lstStyle/>
-          <a:p>
-            <a:pPr algn="ctr"/>
-            <a:r>
-              <a:rPr lang="es-419" sz="1600" dirty="0">
-                <a:solidFill>
-                  <a:srgbClr val="595948"/>
-                </a:solidFill>
-                <a:latin typeface="Copperplate Gothic Bold" panose="020E0705020206020404" pitchFamily="34" charset="0"/>
-              </a:rPr>
-              <a:t>Consultar Material</a:t>
+              <a:t>Consultar Objeto</a:t>
             </a:r>
           </a:p>
         </p:txBody>
@@ -11080,69 +10894,7 @@
                 </a:solidFill>
                 <a:latin typeface="Copperplate Gothic Bold" panose="020E0705020206020404" pitchFamily="34" charset="0"/>
               </a:rPr>
-              <a:t>Consultar Producto</a:t>
-            </a:r>
-          </a:p>
-        </p:txBody>
-      </p:sp>
-      <p:sp>
-        <p:nvSpPr>
-          <p:cNvPr id="5" name="Rectángulo: esquinas redondeadas 4">
-            <a:extLst>
-              <a:ext uri="{FF2B5EF4-FFF2-40B4-BE49-F238E27FC236}">
-                <a16:creationId xmlns:a16="http://schemas.microsoft.com/office/drawing/2014/main" id="{186543CC-FD38-446A-BE03-F1F8902C35FA}"/>
-              </a:ext>
-            </a:extLst>
-          </p:cNvPr>
-          <p:cNvSpPr/>
-          <p:nvPr/>
-        </p:nvSpPr>
-        <p:spPr>
-          <a:xfrm>
-            <a:off x="-3" y="4362450"/>
-            <a:ext cx="2733675" cy="523786"/>
-          </a:xfrm>
-          <a:prstGeom prst="roundRect">
-            <a:avLst>
-              <a:gd name="adj" fmla="val 0"/>
-            </a:avLst>
-          </a:prstGeom>
-          <a:noFill/>
-          <a:ln>
-            <a:solidFill>
-              <a:srgbClr val="595948"/>
-            </a:solidFill>
-          </a:ln>
-        </p:spPr>
-        <p:style>
-          <a:lnRef idx="2">
-            <a:schemeClr val="accent1">
-              <a:shade val="50000"/>
-            </a:schemeClr>
-          </a:lnRef>
-          <a:fillRef idx="1">
-            <a:schemeClr val="accent1"/>
-          </a:fillRef>
-          <a:effectRef idx="0">
-            <a:schemeClr val="accent1"/>
-          </a:effectRef>
-          <a:fontRef idx="minor">
-            <a:schemeClr val="lt1"/>
-          </a:fontRef>
-        </p:style>
-        <p:txBody>
-          <a:bodyPr rtlCol="0" anchor="ctr"/>
-          <a:lstStyle/>
-          <a:p>
-            <a:pPr algn="ctr"/>
-            <a:r>
-              <a:rPr lang="es-419" sz="1600" dirty="0">
-                <a:solidFill>
-                  <a:srgbClr val="595948"/>
-                </a:solidFill>
-                <a:latin typeface="Copperplate Gothic Bold" panose="020E0705020206020404" pitchFamily="34" charset="0"/>
-              </a:rPr>
-              <a:t>Consultar Material</a:t>
+              <a:t>Consultar Objeto</a:t>
             </a:r>
           </a:p>
         </p:txBody>
@@ -12985,69 +12737,7 @@
                 </a:solidFill>
                 <a:latin typeface="Copperplate Gothic Bold" panose="020E0705020206020404" pitchFamily="34" charset="0"/>
               </a:rPr>
-              <a:t>Consultar Producto</a:t>
-            </a:r>
-          </a:p>
-        </p:txBody>
-      </p:sp>
-      <p:sp>
-        <p:nvSpPr>
-          <p:cNvPr id="33" name="Rectángulo: esquinas redondeadas 32">
-            <a:extLst>
-              <a:ext uri="{FF2B5EF4-FFF2-40B4-BE49-F238E27FC236}">
-                <a16:creationId xmlns:a16="http://schemas.microsoft.com/office/drawing/2014/main" id="{134A66D6-FA33-479D-94A3-723085495774}"/>
-              </a:ext>
-            </a:extLst>
-          </p:cNvPr>
-          <p:cNvSpPr/>
-          <p:nvPr/>
-        </p:nvSpPr>
-        <p:spPr>
-          <a:xfrm>
-            <a:off x="-3" y="4543714"/>
-            <a:ext cx="2733675" cy="523786"/>
-          </a:xfrm>
-          <a:prstGeom prst="roundRect">
-            <a:avLst>
-              <a:gd name="adj" fmla="val 0"/>
-            </a:avLst>
-          </a:prstGeom>
-          <a:noFill/>
-          <a:ln>
-            <a:solidFill>
-              <a:srgbClr val="595948"/>
-            </a:solidFill>
-          </a:ln>
-        </p:spPr>
-        <p:style>
-          <a:lnRef idx="2">
-            <a:schemeClr val="accent1">
-              <a:shade val="50000"/>
-            </a:schemeClr>
-          </a:lnRef>
-          <a:fillRef idx="1">
-            <a:schemeClr val="accent1"/>
-          </a:fillRef>
-          <a:effectRef idx="0">
-            <a:schemeClr val="accent1"/>
-          </a:effectRef>
-          <a:fontRef idx="minor">
-            <a:schemeClr val="lt1"/>
-          </a:fontRef>
-        </p:style>
-        <p:txBody>
-          <a:bodyPr rtlCol="0" anchor="ctr"/>
-          <a:lstStyle/>
-          <a:p>
-            <a:pPr algn="ctr"/>
-            <a:r>
-              <a:rPr lang="es-419" sz="1600" dirty="0">
-                <a:solidFill>
-                  <a:srgbClr val="595948"/>
-                </a:solidFill>
-                <a:latin typeface="Copperplate Gothic Bold" panose="020E0705020206020404" pitchFamily="34" charset="0"/>
-              </a:rPr>
-              <a:t>Consultar Material</a:t>
+              <a:t>Consultar Objeto</a:t>
             </a:r>
           </a:p>
         </p:txBody>
@@ -14798,268 +14488,20 @@
       </p:grpSpPr>
       <p:sp>
         <p:nvSpPr>
-          <p:cNvPr id="2" name="Rectángulo: esquinas redondeadas 1">
-            <a:extLst>
-              <a:ext uri="{FF2B5EF4-FFF2-40B4-BE49-F238E27FC236}">
-                <a16:creationId xmlns:a16="http://schemas.microsoft.com/office/drawing/2014/main" id="{15241475-E025-4691-920C-BA056EA24B52}"/>
-              </a:ext>
-            </a:extLst>
-          </p:cNvPr>
-          <p:cNvSpPr/>
-          <p:nvPr/>
-        </p:nvSpPr>
-        <p:spPr>
-          <a:xfrm>
-            <a:off x="0" y="2790914"/>
-            <a:ext cx="2733675" cy="523786"/>
-          </a:xfrm>
-          <a:prstGeom prst="roundRect">
-            <a:avLst>
-              <a:gd name="adj" fmla="val 0"/>
-            </a:avLst>
-          </a:prstGeom>
-          <a:noFill/>
-          <a:ln>
-            <a:solidFill>
-              <a:srgbClr val="595948"/>
-            </a:solidFill>
-          </a:ln>
-        </p:spPr>
-        <p:style>
-          <a:lnRef idx="2">
-            <a:schemeClr val="accent1">
-              <a:shade val="50000"/>
-            </a:schemeClr>
-          </a:lnRef>
-          <a:fillRef idx="1">
-            <a:schemeClr val="accent1"/>
-          </a:fillRef>
-          <a:effectRef idx="0">
-            <a:schemeClr val="accent1"/>
-          </a:effectRef>
-          <a:fontRef idx="minor">
-            <a:schemeClr val="lt1"/>
-          </a:fontRef>
-        </p:style>
-        <p:txBody>
-          <a:bodyPr rtlCol="0" anchor="ctr"/>
-          <a:lstStyle/>
-          <a:p>
-            <a:pPr algn="ctr"/>
-            <a:r>
-              <a:rPr lang="es-419" sz="1600" dirty="0">
-                <a:solidFill>
-                  <a:srgbClr val="595948"/>
-                </a:solidFill>
-                <a:latin typeface="Copperplate Gothic Bold" panose="020E0705020206020404" pitchFamily="34" charset="0"/>
-              </a:rPr>
-              <a:t>Inventario</a:t>
-            </a:r>
-          </a:p>
-        </p:txBody>
-      </p:sp>
-      <p:sp>
-        <p:nvSpPr>
-          <p:cNvPr id="3" name="Rectángulo: esquinas redondeadas 2">
-            <a:extLst>
-              <a:ext uri="{FF2B5EF4-FFF2-40B4-BE49-F238E27FC236}">
-                <a16:creationId xmlns:a16="http://schemas.microsoft.com/office/drawing/2014/main" id="{D06EEDA9-AC81-4C80-B218-F729DAEAADB6}"/>
-              </a:ext>
-            </a:extLst>
-          </p:cNvPr>
-          <p:cNvSpPr/>
-          <p:nvPr/>
-        </p:nvSpPr>
-        <p:spPr>
-          <a:xfrm>
-            <a:off x="-1" y="3314789"/>
-            <a:ext cx="2733675" cy="523786"/>
-          </a:xfrm>
-          <a:prstGeom prst="roundRect">
-            <a:avLst>
-              <a:gd name="adj" fmla="val 0"/>
-            </a:avLst>
-          </a:prstGeom>
-          <a:noFill/>
-          <a:ln>
-            <a:solidFill>
-              <a:srgbClr val="595948"/>
-            </a:solidFill>
-          </a:ln>
-        </p:spPr>
-        <p:style>
-          <a:lnRef idx="2">
-            <a:schemeClr val="accent1">
-              <a:shade val="50000"/>
-            </a:schemeClr>
-          </a:lnRef>
-          <a:fillRef idx="1">
-            <a:schemeClr val="accent1"/>
-          </a:fillRef>
-          <a:effectRef idx="0">
-            <a:schemeClr val="accent1"/>
-          </a:effectRef>
-          <a:fontRef idx="minor">
-            <a:schemeClr val="lt1"/>
-          </a:fontRef>
-        </p:style>
-        <p:txBody>
-          <a:bodyPr rtlCol="0" anchor="ctr"/>
-          <a:lstStyle/>
-          <a:p>
-            <a:pPr algn="ctr"/>
-            <a:r>
-              <a:rPr lang="es-419" sz="1600" dirty="0">
-                <a:solidFill>
-                  <a:srgbClr val="595948"/>
-                </a:solidFill>
-                <a:latin typeface="Copperplate Gothic Bold" panose="020E0705020206020404" pitchFamily="34" charset="0"/>
-              </a:rPr>
-              <a:t>Agregar Producto</a:t>
-            </a:r>
-          </a:p>
-        </p:txBody>
-      </p:sp>
-      <p:sp>
-        <p:nvSpPr>
-          <p:cNvPr id="4" name="Rectángulo: esquinas redondeadas 3">
-            <a:extLst>
-              <a:ext uri="{FF2B5EF4-FFF2-40B4-BE49-F238E27FC236}">
-                <a16:creationId xmlns:a16="http://schemas.microsoft.com/office/drawing/2014/main" id="{727E8340-5505-4667-B3F7-4426021D9BFD}"/>
-              </a:ext>
-            </a:extLst>
-          </p:cNvPr>
-          <p:cNvSpPr/>
-          <p:nvPr/>
-        </p:nvSpPr>
-        <p:spPr>
-          <a:xfrm>
-            <a:off x="-2" y="3838575"/>
-            <a:ext cx="2733675" cy="523786"/>
-          </a:xfrm>
-          <a:prstGeom prst="roundRect">
-            <a:avLst>
-              <a:gd name="adj" fmla="val 0"/>
-            </a:avLst>
-          </a:prstGeom>
-          <a:noFill/>
-          <a:ln>
-            <a:solidFill>
-              <a:srgbClr val="595948"/>
-            </a:solidFill>
-          </a:ln>
-        </p:spPr>
-        <p:style>
-          <a:lnRef idx="2">
-            <a:schemeClr val="accent1">
-              <a:shade val="50000"/>
-            </a:schemeClr>
-          </a:lnRef>
-          <a:fillRef idx="1">
-            <a:schemeClr val="accent1"/>
-          </a:fillRef>
-          <a:effectRef idx="0">
-            <a:schemeClr val="accent1"/>
-          </a:effectRef>
-          <a:fontRef idx="minor">
-            <a:schemeClr val="lt1"/>
-          </a:fontRef>
-        </p:style>
-        <p:txBody>
-          <a:bodyPr rtlCol="0" anchor="ctr"/>
-          <a:lstStyle/>
-          <a:p>
-            <a:pPr algn="ctr"/>
-            <a:r>
-              <a:rPr lang="es-419" sz="1600" dirty="0">
-                <a:solidFill>
-                  <a:srgbClr val="595948"/>
-                </a:solidFill>
-                <a:latin typeface="Copperplate Gothic Bold" panose="020E0705020206020404" pitchFamily="34" charset="0"/>
-              </a:rPr>
-              <a:t>Agregar Material</a:t>
-            </a:r>
-          </a:p>
-        </p:txBody>
-      </p:sp>
-      <p:sp>
-        <p:nvSpPr>
-          <p:cNvPr id="5" name="Rectángulo: esquinas redondeadas 4">
-            <a:extLst>
-              <a:ext uri="{FF2B5EF4-FFF2-40B4-BE49-F238E27FC236}">
-                <a16:creationId xmlns:a16="http://schemas.microsoft.com/office/drawing/2014/main" id="{186543CC-FD38-446A-BE03-F1F8902C35FA}"/>
-              </a:ext>
-            </a:extLst>
-          </p:cNvPr>
-          <p:cNvSpPr/>
-          <p:nvPr/>
-        </p:nvSpPr>
-        <p:spPr>
-          <a:xfrm>
-            <a:off x="-3" y="4362450"/>
-            <a:ext cx="2733675" cy="523786"/>
-          </a:xfrm>
-          <a:prstGeom prst="roundRect">
-            <a:avLst>
-              <a:gd name="adj" fmla="val 0"/>
-            </a:avLst>
-          </a:prstGeom>
-          <a:noFill/>
-          <a:ln>
-            <a:solidFill>
-              <a:srgbClr val="595948"/>
-            </a:solidFill>
-          </a:ln>
-        </p:spPr>
-        <p:style>
-          <a:lnRef idx="2">
-            <a:schemeClr val="accent1">
-              <a:shade val="50000"/>
-            </a:schemeClr>
-          </a:lnRef>
-          <a:fillRef idx="1">
-            <a:schemeClr val="accent1"/>
-          </a:fillRef>
-          <a:effectRef idx="0">
-            <a:schemeClr val="accent1"/>
-          </a:effectRef>
-          <a:fontRef idx="minor">
-            <a:schemeClr val="lt1"/>
-          </a:fontRef>
-        </p:style>
-        <p:txBody>
-          <a:bodyPr rtlCol="0" anchor="ctr"/>
-          <a:lstStyle/>
-          <a:p>
-            <a:pPr algn="ctr"/>
-            <a:r>
-              <a:rPr lang="es-419" sz="1600" dirty="0">
-                <a:solidFill>
-                  <a:srgbClr val="595948"/>
-                </a:solidFill>
-                <a:latin typeface="Copperplate Gothic Bold" panose="020E0705020206020404" pitchFamily="34" charset="0"/>
-              </a:rPr>
-              <a:t>Consultar Material</a:t>
-            </a:r>
-          </a:p>
-        </p:txBody>
-      </p:sp>
-      <p:sp>
-        <p:nvSpPr>
-          <p:cNvPr id="6" name="Rectángulo: esquinas redondeadas 5">
-            <a:extLst>
-              <a:ext uri="{FF2B5EF4-FFF2-40B4-BE49-F238E27FC236}">
-                <a16:creationId xmlns:a16="http://schemas.microsoft.com/office/drawing/2014/main" id="{E64EEC37-CD11-47A8-A343-0D1E7DBB40AE}"/>
-              </a:ext>
-            </a:extLst>
-          </p:cNvPr>
-          <p:cNvSpPr/>
-          <p:nvPr/>
-        </p:nvSpPr>
-        <p:spPr>
-          <a:xfrm>
-            <a:off x="3443272" y="975744"/>
-            <a:ext cx="8148653" cy="4713855"/>
+          <p:cNvPr id="22" name="Rectángulo: esquinas redondeadas 21">
+            <a:extLst>
+              <a:ext uri="{FF2B5EF4-FFF2-40B4-BE49-F238E27FC236}">
+                <a16:creationId xmlns:a16="http://schemas.microsoft.com/office/drawing/2014/main" id="{1F3D263B-E82C-4E32-8924-5CB6EFE8951F}"/>
+              </a:ext>
+            </a:extLst>
+          </p:cNvPr>
+          <p:cNvSpPr/>
+          <p:nvPr/>
+        </p:nvSpPr>
+        <p:spPr>
+          <a:xfrm>
+            <a:off x="3443272" y="920326"/>
+            <a:ext cx="8148653" cy="5129491"/>
           </a:xfrm>
           <a:prstGeom prst="roundRect">
             <a:avLst>
@@ -15107,22 +14549,238 @@
           </a:p>
         </p:txBody>
       </p:sp>
-      <p:sp>
-        <p:nvSpPr>
-          <p:cNvPr id="7" name="Rectángulo 6">
-            <a:extLst>
-              <a:ext uri="{FF2B5EF4-FFF2-40B4-BE49-F238E27FC236}">
-                <a16:creationId xmlns:a16="http://schemas.microsoft.com/office/drawing/2014/main" id="{BC43A1CA-AD13-4762-92FC-2147BA1F6870}"/>
-              </a:ext>
-            </a:extLst>
-          </p:cNvPr>
-          <p:cNvSpPr/>
-          <p:nvPr/>
-        </p:nvSpPr>
-        <p:spPr>
-          <a:xfrm>
-            <a:off x="4088598" y="1162715"/>
-            <a:ext cx="6858000" cy="707886"/>
+      <p:pic>
+        <p:nvPicPr>
+          <p:cNvPr id="31" name="Imagen 30">
+            <a:extLst>
+              <a:ext uri="{FF2B5EF4-FFF2-40B4-BE49-F238E27FC236}">
+                <a16:creationId xmlns:a16="http://schemas.microsoft.com/office/drawing/2014/main" id="{2D97FB65-2465-4A9D-937A-EF2738E83E82}"/>
+              </a:ext>
+            </a:extLst>
+          </p:cNvPr>
+          <p:cNvPicPr>
+            <a:picLocks noChangeAspect="1"/>
+          </p:cNvPicPr>
+          <p:nvPr/>
+        </p:nvPicPr>
+        <p:blipFill>
+          <a:blip r:embed="rId2"/>
+          <a:stretch>
+            <a:fillRect/>
+          </a:stretch>
+        </p:blipFill>
+        <p:spPr>
+          <a:xfrm>
+            <a:off x="8209355" y="2506021"/>
+            <a:ext cx="2956631" cy="2639849"/>
+          </a:xfrm>
+          <a:prstGeom prst="rect">
+            <a:avLst/>
+          </a:prstGeom>
+        </p:spPr>
+      </p:pic>
+      <p:sp>
+        <p:nvSpPr>
+          <p:cNvPr id="2" name="Rectángulo: esquinas redondeadas 1">
+            <a:extLst>
+              <a:ext uri="{FF2B5EF4-FFF2-40B4-BE49-F238E27FC236}">
+                <a16:creationId xmlns:a16="http://schemas.microsoft.com/office/drawing/2014/main" id="{15241475-E025-4691-920C-BA056EA24B52}"/>
+              </a:ext>
+            </a:extLst>
+          </p:cNvPr>
+          <p:cNvSpPr/>
+          <p:nvPr/>
+        </p:nvSpPr>
+        <p:spPr>
+          <a:xfrm>
+            <a:off x="0" y="2790914"/>
+            <a:ext cx="2733675" cy="523786"/>
+          </a:xfrm>
+          <a:prstGeom prst="roundRect">
+            <a:avLst>
+              <a:gd name="adj" fmla="val 0"/>
+            </a:avLst>
+          </a:prstGeom>
+          <a:noFill/>
+          <a:ln>
+            <a:solidFill>
+              <a:srgbClr val="595948"/>
+            </a:solidFill>
+          </a:ln>
+        </p:spPr>
+        <p:style>
+          <a:lnRef idx="2">
+            <a:schemeClr val="accent1">
+              <a:shade val="50000"/>
+            </a:schemeClr>
+          </a:lnRef>
+          <a:fillRef idx="1">
+            <a:schemeClr val="accent1"/>
+          </a:fillRef>
+          <a:effectRef idx="0">
+            <a:schemeClr val="accent1"/>
+          </a:effectRef>
+          <a:fontRef idx="minor">
+            <a:schemeClr val="lt1"/>
+          </a:fontRef>
+        </p:style>
+        <p:txBody>
+          <a:bodyPr rtlCol="0" anchor="ctr"/>
+          <a:lstStyle/>
+          <a:p>
+            <a:pPr algn="ctr"/>
+            <a:r>
+              <a:rPr lang="es-419" sz="1600" dirty="0">
+                <a:solidFill>
+                  <a:srgbClr val="595948"/>
+                </a:solidFill>
+                <a:latin typeface="Copperplate Gothic Bold" panose="020E0705020206020404" pitchFamily="34" charset="0"/>
+              </a:rPr>
+              <a:t>Inventario</a:t>
+            </a:r>
+          </a:p>
+        </p:txBody>
+      </p:sp>
+      <p:sp>
+        <p:nvSpPr>
+          <p:cNvPr id="3" name="Rectángulo: esquinas redondeadas 2">
+            <a:extLst>
+              <a:ext uri="{FF2B5EF4-FFF2-40B4-BE49-F238E27FC236}">
+                <a16:creationId xmlns:a16="http://schemas.microsoft.com/office/drawing/2014/main" id="{D06EEDA9-AC81-4C80-B218-F729DAEAADB6}"/>
+              </a:ext>
+            </a:extLst>
+          </p:cNvPr>
+          <p:cNvSpPr/>
+          <p:nvPr/>
+        </p:nvSpPr>
+        <p:spPr>
+          <a:xfrm>
+            <a:off x="-1" y="3314789"/>
+            <a:ext cx="2733675" cy="523786"/>
+          </a:xfrm>
+          <a:prstGeom prst="roundRect">
+            <a:avLst>
+              <a:gd name="adj" fmla="val 0"/>
+            </a:avLst>
+          </a:prstGeom>
+          <a:noFill/>
+          <a:ln>
+            <a:solidFill>
+              <a:srgbClr val="595948"/>
+            </a:solidFill>
+          </a:ln>
+        </p:spPr>
+        <p:style>
+          <a:lnRef idx="2">
+            <a:schemeClr val="accent1">
+              <a:shade val="50000"/>
+            </a:schemeClr>
+          </a:lnRef>
+          <a:fillRef idx="1">
+            <a:schemeClr val="accent1"/>
+          </a:fillRef>
+          <a:effectRef idx="0">
+            <a:schemeClr val="accent1"/>
+          </a:effectRef>
+          <a:fontRef idx="minor">
+            <a:schemeClr val="lt1"/>
+          </a:fontRef>
+        </p:style>
+        <p:txBody>
+          <a:bodyPr rtlCol="0" anchor="ctr"/>
+          <a:lstStyle/>
+          <a:p>
+            <a:pPr algn="ctr"/>
+            <a:r>
+              <a:rPr lang="es-419" sz="1600" dirty="0">
+                <a:solidFill>
+                  <a:srgbClr val="595948"/>
+                </a:solidFill>
+                <a:latin typeface="Copperplate Gothic Bold" panose="020E0705020206020404" pitchFamily="34" charset="0"/>
+              </a:rPr>
+              <a:t>Agregar Producto</a:t>
+            </a:r>
+          </a:p>
+        </p:txBody>
+      </p:sp>
+      <p:sp>
+        <p:nvSpPr>
+          <p:cNvPr id="4" name="Rectángulo: esquinas redondeadas 3">
+            <a:extLst>
+              <a:ext uri="{FF2B5EF4-FFF2-40B4-BE49-F238E27FC236}">
+                <a16:creationId xmlns:a16="http://schemas.microsoft.com/office/drawing/2014/main" id="{727E8340-5505-4667-B3F7-4426021D9BFD}"/>
+              </a:ext>
+            </a:extLst>
+          </p:cNvPr>
+          <p:cNvSpPr/>
+          <p:nvPr/>
+        </p:nvSpPr>
+        <p:spPr>
+          <a:xfrm>
+            <a:off x="-2" y="3838575"/>
+            <a:ext cx="2733675" cy="523786"/>
+          </a:xfrm>
+          <a:prstGeom prst="roundRect">
+            <a:avLst>
+              <a:gd name="adj" fmla="val 0"/>
+            </a:avLst>
+          </a:prstGeom>
+          <a:noFill/>
+          <a:ln>
+            <a:solidFill>
+              <a:srgbClr val="595948"/>
+            </a:solidFill>
+          </a:ln>
+        </p:spPr>
+        <p:style>
+          <a:lnRef idx="2">
+            <a:schemeClr val="accent1">
+              <a:shade val="50000"/>
+            </a:schemeClr>
+          </a:lnRef>
+          <a:fillRef idx="1">
+            <a:schemeClr val="accent1"/>
+          </a:fillRef>
+          <a:effectRef idx="0">
+            <a:schemeClr val="accent1"/>
+          </a:effectRef>
+          <a:fontRef idx="minor">
+            <a:schemeClr val="lt1"/>
+          </a:fontRef>
+        </p:style>
+        <p:txBody>
+          <a:bodyPr rtlCol="0" anchor="ctr"/>
+          <a:lstStyle/>
+          <a:p>
+            <a:pPr algn="ctr"/>
+            <a:r>
+              <a:rPr lang="es-419" sz="1600" dirty="0">
+                <a:solidFill>
+                  <a:srgbClr val="595948"/>
+                </a:solidFill>
+                <a:latin typeface="Copperplate Gothic Bold" panose="020E0705020206020404" pitchFamily="34" charset="0"/>
+              </a:rPr>
+              <a:t>Agregar Material</a:t>
+            </a:r>
+          </a:p>
+        </p:txBody>
+      </p:sp>
+      <p:sp>
+        <p:nvSpPr>
+          <p:cNvPr id="24" name="Rectángulo 23">
+            <a:extLst>
+              <a:ext uri="{FF2B5EF4-FFF2-40B4-BE49-F238E27FC236}">
+                <a16:creationId xmlns:a16="http://schemas.microsoft.com/office/drawing/2014/main" id="{576C84F5-4F23-4DB4-BDD5-654F54948D0B}"/>
+              </a:ext>
+            </a:extLst>
+          </p:cNvPr>
+          <p:cNvSpPr/>
+          <p:nvPr/>
+        </p:nvSpPr>
+        <p:spPr>
+          <a:xfrm>
+            <a:off x="3840242" y="3799065"/>
+            <a:ext cx="3167839" cy="338554"/>
           </a:xfrm>
           <a:prstGeom prst="rect">
             <a:avLst/>
@@ -15135,18 +14793,13 @@
           </a:bodyPr>
           <a:lstStyle/>
           <a:p>
-            <a:pPr algn="ctr"/>
-            <a:r>
-              <a:rPr lang="es-ES" sz="4000" b="1" cap="none" spc="0" dirty="0">
+            <a:r>
+              <a:rPr lang="es-ES" sz="1600" b="1" cap="none" spc="0" dirty="0">
                 <a:ln w="0">
-                  <a:solidFill>
-                    <a:schemeClr val="bg1">
-                      <a:lumMod val="50000"/>
-                    </a:schemeClr>
-                  </a:solidFill>
+                  <a:noFill/>
                 </a:ln>
                 <a:solidFill>
-                  <a:srgbClr val="F3EDED"/>
+                  <a:srgbClr val="3D4536"/>
                 </a:solidFill>
                 <a:effectLst>
                   <a:outerShdw blurRad="38100" dist="38100" dir="2700000" algn="tl">
@@ -15157,27 +14810,147 @@
                 </a:effectLst>
                 <a:latin typeface="Copperplate Gothic Bold" panose="020E0705020206020404" pitchFamily="34" charset="0"/>
               </a:rPr>
-              <a:t>Consultar Producto</a:t>
-            </a:r>
-          </a:p>
-        </p:txBody>
-      </p:sp>
-      <p:sp>
-        <p:nvSpPr>
-          <p:cNvPr id="8" name="Rectángulo 7">
-            <a:extLst>
-              <a:ext uri="{FF2B5EF4-FFF2-40B4-BE49-F238E27FC236}">
-                <a16:creationId xmlns:a16="http://schemas.microsoft.com/office/drawing/2014/main" id="{301A74A6-AEA1-49AA-80CE-7A9229D1F8BB}"/>
-              </a:ext>
-            </a:extLst>
-          </p:cNvPr>
-          <p:cNvSpPr/>
-          <p:nvPr/>
-        </p:nvSpPr>
-        <p:spPr>
-          <a:xfrm>
-            <a:off x="3745446" y="2866547"/>
-            <a:ext cx="3133128" cy="584775"/>
+              <a:t>Categoría: </a:t>
+            </a:r>
+            <a:r>
+              <a:rPr lang="es-ES" sz="1600" b="1" dirty="0">
+                <a:ln w="0">
+                  <a:solidFill>
+                    <a:schemeClr val="bg1">
+                      <a:lumMod val="50000"/>
+                    </a:schemeClr>
+                  </a:solidFill>
+                </a:ln>
+                <a:solidFill>
+                  <a:srgbClr val="F3EDED"/>
+                </a:solidFill>
+                <a:latin typeface="Copperplate Gothic Bold" panose="020E0705020206020404" pitchFamily="34" charset="0"/>
+              </a:rPr>
+              <a:t>Anillo</a:t>
+            </a:r>
+            <a:endParaRPr lang="es-ES" sz="1600" b="1" cap="none" spc="0" dirty="0">
+              <a:ln w="0">
+                <a:solidFill>
+                  <a:schemeClr val="bg1">
+                    <a:lumMod val="50000"/>
+                  </a:schemeClr>
+                </a:solidFill>
+              </a:ln>
+              <a:solidFill>
+                <a:srgbClr val="F3EDED"/>
+              </a:solidFill>
+              <a:latin typeface="Copperplate Gothic Bold" panose="020E0705020206020404" pitchFamily="34" charset="0"/>
+            </a:endParaRPr>
+          </a:p>
+        </p:txBody>
+      </p:sp>
+      <p:pic>
+        <p:nvPicPr>
+          <p:cNvPr id="14" name="Imagen 13">
+            <a:extLst>
+              <a:ext uri="{FF2B5EF4-FFF2-40B4-BE49-F238E27FC236}">
+                <a16:creationId xmlns:a16="http://schemas.microsoft.com/office/drawing/2014/main" id="{BBAB133C-4748-47B5-93A9-DB69F4FE645A}"/>
+              </a:ext>
+            </a:extLst>
+          </p:cNvPr>
+          <p:cNvPicPr>
+            <a:picLocks noChangeAspect="1"/>
+          </p:cNvPicPr>
+          <p:nvPr/>
+        </p:nvPicPr>
+        <p:blipFill>
+          <a:blip r:embed="rId3">
+            <a:extLst>
+              <a:ext uri="{28A0092B-C50C-407E-A947-70E740481C1C}">
+                <a14:useLocalDpi xmlns:a14="http://schemas.microsoft.com/office/drawing/2010/main" val="0"/>
+              </a:ext>
+            </a:extLst>
+          </a:blip>
+          <a:stretch>
+            <a:fillRect/>
+          </a:stretch>
+        </p:blipFill>
+        <p:spPr>
+          <a:xfrm>
+            <a:off x="8518817" y="2643051"/>
+            <a:ext cx="2342065" cy="2342065"/>
+          </a:xfrm>
+          <a:prstGeom prst="rect">
+            <a:avLst/>
+          </a:prstGeom>
+        </p:spPr>
+      </p:pic>
+      <p:sp>
+        <p:nvSpPr>
+          <p:cNvPr id="23" name="Rectángulo 22">
+            <a:extLst>
+              <a:ext uri="{FF2B5EF4-FFF2-40B4-BE49-F238E27FC236}">
+                <a16:creationId xmlns:a16="http://schemas.microsoft.com/office/drawing/2014/main" id="{4F899335-6F31-446C-8723-11D06FE9A74B}"/>
+              </a:ext>
+            </a:extLst>
+          </p:cNvPr>
+          <p:cNvSpPr/>
+          <p:nvPr/>
+        </p:nvSpPr>
+        <p:spPr>
+          <a:xfrm>
+            <a:off x="4088598" y="1107298"/>
+            <a:ext cx="6858000" cy="707886"/>
+          </a:xfrm>
+          <a:prstGeom prst="rect">
+            <a:avLst/>
+          </a:prstGeom>
+          <a:noFill/>
+        </p:spPr>
+        <p:txBody>
+          <a:bodyPr wrap="square" lIns="91440" tIns="45720" rIns="91440" bIns="45720">
+            <a:spAutoFit/>
+          </a:bodyPr>
+          <a:lstStyle/>
+          <a:p>
+            <a:pPr algn="ctr"/>
+            <a:r>
+              <a:rPr lang="es-ES" sz="4000" b="1" cap="none" spc="0" dirty="0">
+                <a:ln w="0">
+                  <a:solidFill>
+                    <a:schemeClr val="bg1">
+                      <a:lumMod val="50000"/>
+                    </a:schemeClr>
+                  </a:solidFill>
+                </a:ln>
+                <a:solidFill>
+                  <a:srgbClr val="F3EDED"/>
+                </a:solidFill>
+                <a:effectLst>
+                  <a:outerShdw blurRad="38100" dist="38100" dir="2700000" algn="tl">
+                    <a:srgbClr val="000000">
+                      <a:alpha val="43137"/>
+                    </a:srgbClr>
+                  </a:outerShdw>
+                </a:effectLst>
+                <a:latin typeface="Copperplate Gothic Bold" panose="020E0705020206020404" pitchFamily="34" charset="0"/>
+              </a:rPr>
+              <a:t>Consultar Objeto</a:t>
+            </a:r>
+          </a:p>
+        </p:txBody>
+      </p:sp>
+      <p:sp>
+        <p:nvSpPr>
+          <p:cNvPr id="25" name="Rectángulo 24">
+            <a:extLst>
+              <a:ext uri="{FF2B5EF4-FFF2-40B4-BE49-F238E27FC236}">
+                <a16:creationId xmlns:a16="http://schemas.microsoft.com/office/drawing/2014/main" id="{58E03687-6EB5-4374-AF12-157806A41475}"/>
+              </a:ext>
+            </a:extLst>
+          </p:cNvPr>
+          <p:cNvSpPr/>
+          <p:nvPr/>
+        </p:nvSpPr>
+        <p:spPr>
+          <a:xfrm>
+            <a:off x="3828570" y="2688176"/>
+            <a:ext cx="3133128" cy="338554"/>
           </a:xfrm>
           <a:prstGeom prst="rect">
             <a:avLst/>
@@ -15223,42 +14996,39 @@
                 </a:solidFill>
                 <a:latin typeface="Copperplate Gothic Bold" panose="020E0705020206020404" pitchFamily="34" charset="0"/>
               </a:rPr>
-              <a:t>Anillo de Jade Rojo Pulido</a:t>
-            </a:r>
-            <a:r>
-              <a:rPr lang="es-ES" sz="1600" b="1" cap="none" spc="0" dirty="0">
-                <a:ln w="0">
-                  <a:solidFill>
-                    <a:schemeClr val="bg1">
-                      <a:lumMod val="50000"/>
-                    </a:schemeClr>
-                  </a:solidFill>
-                </a:ln>
-                <a:solidFill>
-                  <a:srgbClr val="F3EDED"/>
-                </a:solidFill>
-                <a:latin typeface="Copperplate Gothic Bold" panose="020E0705020206020404" pitchFamily="34" charset="0"/>
-              </a:rPr>
-              <a:t> </a:t>
-            </a:r>
-          </a:p>
-        </p:txBody>
-      </p:sp>
-      <p:sp>
-        <p:nvSpPr>
-          <p:cNvPr id="10" name="Rectángulo 9">
-            <a:extLst>
-              <a:ext uri="{FF2B5EF4-FFF2-40B4-BE49-F238E27FC236}">
-                <a16:creationId xmlns:a16="http://schemas.microsoft.com/office/drawing/2014/main" id="{591BBDB9-BBDD-4520-A4E8-1898B4995C7F}"/>
-              </a:ext>
-            </a:extLst>
-          </p:cNvPr>
-          <p:cNvSpPr/>
-          <p:nvPr/>
-        </p:nvSpPr>
-        <p:spPr>
-          <a:xfrm>
-            <a:off x="3745446" y="3507669"/>
+              <a:t>Obsidiana</a:t>
+            </a:r>
+            <a:endParaRPr lang="es-ES" sz="1600" b="1" cap="none" spc="0" dirty="0">
+              <a:ln w="0">
+                <a:solidFill>
+                  <a:schemeClr val="bg1">
+                    <a:lumMod val="50000"/>
+                  </a:schemeClr>
+                </a:solidFill>
+              </a:ln>
+              <a:solidFill>
+                <a:srgbClr val="F3EDED"/>
+              </a:solidFill>
+              <a:latin typeface="Copperplate Gothic Bold" panose="020E0705020206020404" pitchFamily="34" charset="0"/>
+            </a:endParaRPr>
+          </a:p>
+        </p:txBody>
+      </p:sp>
+      <p:sp>
+        <p:nvSpPr>
+          <p:cNvPr id="26" name="Rectángulo 25">
+            <a:extLst>
+              <a:ext uri="{FF2B5EF4-FFF2-40B4-BE49-F238E27FC236}">
+                <a16:creationId xmlns:a16="http://schemas.microsoft.com/office/drawing/2014/main" id="{240DF02B-EA86-412D-BF7C-6E0FF4B436FD}"/>
+              </a:ext>
+            </a:extLst>
+          </p:cNvPr>
+          <p:cNvSpPr/>
+          <p:nvPr/>
+        </p:nvSpPr>
+        <p:spPr>
+          <a:xfrm>
+            <a:off x="3840242" y="3070711"/>
             <a:ext cx="3133127" cy="338554"/>
           </a:xfrm>
           <a:prstGeom prst="rect">
@@ -15305,26 +15075,26 @@
                 </a:solidFill>
                 <a:latin typeface="Copperplate Gothic Bold" panose="020E0705020206020404" pitchFamily="34" charset="0"/>
               </a:rPr>
-              <a:t>8000.0$</a:t>
-            </a:r>
-          </a:p>
-        </p:txBody>
-      </p:sp>
-      <p:sp>
-        <p:nvSpPr>
-          <p:cNvPr id="17" name="Rectángulo 16">
-            <a:extLst>
-              <a:ext uri="{FF2B5EF4-FFF2-40B4-BE49-F238E27FC236}">
-                <a16:creationId xmlns:a16="http://schemas.microsoft.com/office/drawing/2014/main" id="{CBA53646-ECDA-4FCC-A6A3-2CE6556DC163}"/>
-              </a:ext>
-            </a:extLst>
-          </p:cNvPr>
-          <p:cNvSpPr/>
-          <p:nvPr/>
-        </p:nvSpPr>
-        <p:spPr>
-          <a:xfrm>
-            <a:off x="3745447" y="3876461"/>
+              <a:t>2000.0$</a:t>
+            </a:r>
+          </a:p>
+        </p:txBody>
+      </p:sp>
+      <p:sp>
+        <p:nvSpPr>
+          <p:cNvPr id="27" name="Rectángulo 26">
+            <a:extLst>
+              <a:ext uri="{FF2B5EF4-FFF2-40B4-BE49-F238E27FC236}">
+                <a16:creationId xmlns:a16="http://schemas.microsoft.com/office/drawing/2014/main" id="{0089464E-2A8C-4929-989A-00375FEB97F6}"/>
+              </a:ext>
+            </a:extLst>
+          </p:cNvPr>
+          <p:cNvSpPr/>
+          <p:nvPr/>
+        </p:nvSpPr>
+        <p:spPr>
+          <a:xfrm>
+            <a:off x="3840243" y="3439503"/>
             <a:ext cx="3133126" cy="338554"/>
           </a:xfrm>
           <a:prstGeom prst="rect">
@@ -15394,240 +15164,19 @@
       </p:sp>
       <p:sp>
         <p:nvSpPr>
-          <p:cNvPr id="24" name="Rectángulo 23">
-            <a:extLst>
-              <a:ext uri="{FF2B5EF4-FFF2-40B4-BE49-F238E27FC236}">
-                <a16:creationId xmlns:a16="http://schemas.microsoft.com/office/drawing/2014/main" id="{576C84F5-4F23-4DB4-BDD5-654F54948D0B}"/>
-              </a:ext>
-            </a:extLst>
-          </p:cNvPr>
-          <p:cNvSpPr/>
-          <p:nvPr/>
-        </p:nvSpPr>
-        <p:spPr>
-          <a:xfrm>
-            <a:off x="3745447" y="4249629"/>
-            <a:ext cx="3167839" cy="338554"/>
-          </a:xfrm>
-          <a:prstGeom prst="rect">
-            <a:avLst/>
-          </a:prstGeom>
-          <a:noFill/>
-        </p:spPr>
-        <p:txBody>
-          <a:bodyPr wrap="square" lIns="91440" tIns="45720" rIns="91440" bIns="45720">
-            <a:spAutoFit/>
-          </a:bodyPr>
-          <a:lstStyle/>
-          <a:p>
-            <a:r>
-              <a:rPr lang="es-ES" sz="1600" b="1" cap="none" spc="0" dirty="0">
-                <a:ln w="0">
-                  <a:noFill/>
-                </a:ln>
-                <a:solidFill>
-                  <a:srgbClr val="3D4536"/>
-                </a:solidFill>
-                <a:effectLst>
-                  <a:outerShdw blurRad="38100" dist="38100" dir="2700000" algn="tl">
-                    <a:srgbClr val="000000">
-                      <a:alpha val="43137"/>
-                    </a:srgbClr>
-                  </a:outerShdw>
-                </a:effectLst>
-                <a:latin typeface="Copperplate Gothic Bold" panose="020E0705020206020404" pitchFamily="34" charset="0"/>
-              </a:rPr>
-              <a:t>Categoría: </a:t>
-            </a:r>
-            <a:r>
-              <a:rPr lang="es-ES" sz="1600" b="1" dirty="0">
-                <a:ln w="0">
-                  <a:solidFill>
-                    <a:schemeClr val="bg1">
-                      <a:lumMod val="50000"/>
-                    </a:schemeClr>
-                  </a:solidFill>
-                </a:ln>
-                <a:solidFill>
-                  <a:srgbClr val="F3EDED"/>
-                </a:solidFill>
-                <a:latin typeface="Copperplate Gothic Bold" panose="020E0705020206020404" pitchFamily="34" charset="0"/>
-              </a:rPr>
-              <a:t>Anillo</a:t>
-            </a:r>
-            <a:endParaRPr lang="es-ES" sz="1600" b="1" cap="none" spc="0" dirty="0">
-              <a:ln w="0">
-                <a:solidFill>
-                  <a:schemeClr val="bg1">
-                    <a:lumMod val="50000"/>
-                  </a:schemeClr>
-                </a:solidFill>
-              </a:ln>
-              <a:solidFill>
-                <a:srgbClr val="F3EDED"/>
-              </a:solidFill>
-              <a:latin typeface="Copperplate Gothic Bold" panose="020E0705020206020404" pitchFamily="34" charset="0"/>
-            </a:endParaRPr>
-          </a:p>
-        </p:txBody>
-      </p:sp>
-      <p:sp>
-        <p:nvSpPr>
-          <p:cNvPr id="29" name="Rectángulo 28">
-            <a:extLst>
-              <a:ext uri="{FF2B5EF4-FFF2-40B4-BE49-F238E27FC236}">
-                <a16:creationId xmlns:a16="http://schemas.microsoft.com/office/drawing/2014/main" id="{CD93DB1A-9719-4150-932A-135F204ABE8F}"/>
-              </a:ext>
-            </a:extLst>
-          </p:cNvPr>
-          <p:cNvSpPr/>
-          <p:nvPr/>
-        </p:nvSpPr>
-        <p:spPr>
-          <a:xfrm>
-            <a:off x="3752132" y="4657763"/>
-            <a:ext cx="2171105" cy="338554"/>
-          </a:xfrm>
-          <a:prstGeom prst="rect">
-            <a:avLst/>
-          </a:prstGeom>
-          <a:noFill/>
-        </p:spPr>
-        <p:txBody>
-          <a:bodyPr wrap="square" lIns="91440" tIns="45720" rIns="91440" bIns="45720">
-            <a:spAutoFit/>
-          </a:bodyPr>
-          <a:lstStyle/>
-          <a:p>
-            <a:r>
-              <a:rPr lang="es-ES" sz="1600" b="1" cap="none" spc="0" dirty="0">
-                <a:ln w="0">
-                  <a:noFill/>
-                </a:ln>
-                <a:solidFill>
-                  <a:srgbClr val="3D4536"/>
-                </a:solidFill>
-                <a:effectLst>
-                  <a:outerShdw blurRad="38100" dist="38100" dir="2700000" algn="tl">
-                    <a:srgbClr val="000000">
-                      <a:alpha val="43137"/>
-                    </a:srgbClr>
-                  </a:outerShdw>
-                </a:effectLst>
-                <a:latin typeface="Copperplate Gothic Bold" panose="020E0705020206020404" pitchFamily="34" charset="0"/>
-              </a:rPr>
-              <a:t>Materiales:</a:t>
-            </a:r>
-          </a:p>
-        </p:txBody>
-      </p:sp>
-      <p:sp>
-        <p:nvSpPr>
-          <p:cNvPr id="30" name="Rectángulo: esquinas redondeadas 29">
-            <a:extLst>
-              <a:ext uri="{FF2B5EF4-FFF2-40B4-BE49-F238E27FC236}">
-                <a16:creationId xmlns:a16="http://schemas.microsoft.com/office/drawing/2014/main" id="{020692AC-F635-454B-AFDC-E1D3A5AE19FF}"/>
-              </a:ext>
-            </a:extLst>
-          </p:cNvPr>
-          <p:cNvSpPr/>
-          <p:nvPr/>
-        </p:nvSpPr>
-        <p:spPr>
-          <a:xfrm>
-            <a:off x="5487056" y="4650150"/>
-            <a:ext cx="1419225" cy="357693"/>
-          </a:xfrm>
-          <a:prstGeom prst="roundRect">
-            <a:avLst/>
-          </a:prstGeom>
-          <a:solidFill>
-            <a:srgbClr val="025939"/>
-          </a:solidFill>
-          <a:ln>
-            <a:solidFill>
-              <a:srgbClr val="025939"/>
-            </a:solidFill>
-          </a:ln>
-        </p:spPr>
-        <p:style>
-          <a:lnRef idx="2">
-            <a:schemeClr val="accent1">
-              <a:shade val="50000"/>
-            </a:schemeClr>
-          </a:lnRef>
-          <a:fillRef idx="1">
-            <a:schemeClr val="accent1"/>
-          </a:fillRef>
-          <a:effectRef idx="0">
-            <a:schemeClr val="accent1"/>
-          </a:effectRef>
-          <a:fontRef idx="minor">
-            <a:schemeClr val="lt1"/>
-          </a:fontRef>
-        </p:style>
-        <p:txBody>
-          <a:bodyPr rtlCol="0" anchor="ctr"/>
-          <a:lstStyle/>
-          <a:p>
-            <a:pPr algn="ctr"/>
-            <a:r>
-              <a:rPr lang="es-419" sz="1200" dirty="0">
-                <a:solidFill>
-                  <a:srgbClr val="F2F2F2"/>
-                </a:solidFill>
-                <a:latin typeface="Copperplate Gothic Bold" panose="020E0705020206020404" pitchFamily="34" charset="0"/>
-              </a:rPr>
-              <a:t>Consultar</a:t>
-            </a:r>
-          </a:p>
-        </p:txBody>
-      </p:sp>
-      <p:pic>
-        <p:nvPicPr>
-          <p:cNvPr id="33" name="Imagen 32">
-            <a:extLst>
-              <a:ext uri="{FF2B5EF4-FFF2-40B4-BE49-F238E27FC236}">
-                <a16:creationId xmlns:a16="http://schemas.microsoft.com/office/drawing/2014/main" id="{55430480-3A99-4117-B349-6FF0466BD5DB}"/>
-              </a:ext>
-            </a:extLst>
-          </p:cNvPr>
-          <p:cNvPicPr>
-            <a:picLocks noChangeAspect="1"/>
-          </p:cNvPicPr>
-          <p:nvPr/>
-        </p:nvPicPr>
-        <p:blipFill>
-          <a:blip r:embed="rId2"/>
-          <a:stretch>
-            <a:fillRect/>
-          </a:stretch>
-        </p:blipFill>
-        <p:spPr>
-          <a:xfrm>
-            <a:off x="8478016" y="2200208"/>
-            <a:ext cx="1614544" cy="1441557"/>
-          </a:xfrm>
-          <a:prstGeom prst="rect">
-            <a:avLst/>
-          </a:prstGeom>
-        </p:spPr>
-      </p:pic>
-      <p:sp>
-        <p:nvSpPr>
-          <p:cNvPr id="34" name="Rectángulo 33">
-            <a:extLst>
-              <a:ext uri="{FF2B5EF4-FFF2-40B4-BE49-F238E27FC236}">
-                <a16:creationId xmlns:a16="http://schemas.microsoft.com/office/drawing/2014/main" id="{2C53DC9F-50E8-418A-B0C3-F341B501A021}"/>
-              </a:ext>
-            </a:extLst>
-          </p:cNvPr>
-          <p:cNvSpPr/>
-          <p:nvPr/>
-        </p:nvSpPr>
-        <p:spPr>
-          <a:xfrm>
-            <a:off x="7302289" y="3784898"/>
+          <p:cNvPr id="32" name="Rectángulo 31">
+            <a:extLst>
+              <a:ext uri="{FF2B5EF4-FFF2-40B4-BE49-F238E27FC236}">
+                <a16:creationId xmlns:a16="http://schemas.microsoft.com/office/drawing/2014/main" id="{8F20BB36-C677-4FC2-8D07-B009B4911E96}"/>
+              </a:ext>
+            </a:extLst>
+          </p:cNvPr>
+          <p:cNvSpPr/>
+          <p:nvPr/>
+        </p:nvSpPr>
+        <p:spPr>
+          <a:xfrm>
+            <a:off x="3842984" y="4171245"/>
             <a:ext cx="3337135" cy="338554"/>
           </a:xfrm>
           <a:prstGeom prst="rect">
@@ -15665,19 +15214,19 @@
       </p:sp>
       <p:sp>
         <p:nvSpPr>
-          <p:cNvPr id="35" name="Rectángulo: esquinas redondeadas 34">
-            <a:extLst>
-              <a:ext uri="{FF2B5EF4-FFF2-40B4-BE49-F238E27FC236}">
-                <a16:creationId xmlns:a16="http://schemas.microsoft.com/office/drawing/2014/main" id="{0F6A7A17-71EE-49D5-9EE1-64C9E41A261D}"/>
-              </a:ext>
-            </a:extLst>
-          </p:cNvPr>
-          <p:cNvSpPr/>
-          <p:nvPr/>
-        </p:nvSpPr>
-        <p:spPr>
-          <a:xfrm>
-            <a:off x="7335881" y="4181876"/>
+          <p:cNvPr id="36" name="Rectángulo: esquinas redondeadas 35">
+            <a:extLst>
+              <a:ext uri="{FF2B5EF4-FFF2-40B4-BE49-F238E27FC236}">
+                <a16:creationId xmlns:a16="http://schemas.microsoft.com/office/drawing/2014/main" id="{EC9192F6-6D94-4AF2-8241-49FD3519079A}"/>
+              </a:ext>
+            </a:extLst>
+          </p:cNvPr>
+          <p:cNvSpPr/>
+          <p:nvPr/>
+        </p:nvSpPr>
+        <p:spPr>
+          <a:xfrm>
+            <a:off x="3922297" y="4526642"/>
             <a:ext cx="3875037" cy="1067812"/>
           </a:xfrm>
           <a:prstGeom prst="roundRect">
@@ -15724,10 +15273,10 @@
       </p:sp>
       <p:sp>
         <p:nvSpPr>
-          <p:cNvPr id="37" name="CuadroTexto 36">
-            <a:extLst>
-              <a:ext uri="{FF2B5EF4-FFF2-40B4-BE49-F238E27FC236}">
-                <a16:creationId xmlns:a16="http://schemas.microsoft.com/office/drawing/2014/main" id="{751E5337-8EAE-45CF-8F39-E0F45F60A0EF}"/>
+          <p:cNvPr id="38" name="CuadroTexto 37">
+            <a:extLst>
+              <a:ext uri="{FF2B5EF4-FFF2-40B4-BE49-F238E27FC236}">
+                <a16:creationId xmlns:a16="http://schemas.microsoft.com/office/drawing/2014/main" id="{6123D183-E139-495D-A9AC-F84B922D1463}"/>
               </a:ext>
             </a:extLst>
           </p:cNvPr>
@@ -15736,8 +15285,8 @@
         </p:nvSpPr>
         <p:spPr>
           <a:xfrm>
-            <a:off x="7335880" y="4215563"/>
-            <a:ext cx="3875037" cy="276999"/>
+            <a:off x="3922297" y="4560329"/>
+            <a:ext cx="3838092" cy="276999"/>
           </a:xfrm>
           <a:prstGeom prst="rect">
             <a:avLst/>
@@ -15757,62 +15306,26 @@
                 </a:solidFill>
                 <a:latin typeface="Copperplate Gothic Bold" panose="020E0705020206020404" pitchFamily="34" charset="0"/>
               </a:rPr>
-              <a:t>Anillo con estilo americano y joya de jade</a:t>
-            </a:r>
-          </a:p>
-        </p:txBody>
-      </p:sp>
-      <p:pic>
-        <p:nvPicPr>
-          <p:cNvPr id="14" name="Imagen 13">
-            <a:extLst>
-              <a:ext uri="{FF2B5EF4-FFF2-40B4-BE49-F238E27FC236}">
-                <a16:creationId xmlns:a16="http://schemas.microsoft.com/office/drawing/2014/main" id="{BBAB133C-4748-47B5-93A9-DB69F4FE645A}"/>
-              </a:ext>
-            </a:extLst>
-          </p:cNvPr>
-          <p:cNvPicPr>
-            <a:picLocks noChangeAspect="1"/>
-          </p:cNvPicPr>
-          <p:nvPr/>
-        </p:nvPicPr>
-        <p:blipFill>
-          <a:blip r:embed="rId3">
-            <a:extLst>
-              <a:ext uri="{28A0092B-C50C-407E-A947-70E740481C1C}">
-                <a14:useLocalDpi xmlns:a14="http://schemas.microsoft.com/office/drawing/2010/main" val="0"/>
-              </a:ext>
-            </a:extLst>
-          </a:blip>
-          <a:stretch>
-            <a:fillRect/>
-          </a:stretch>
-        </p:blipFill>
-        <p:spPr>
-          <a:xfrm>
-            <a:off x="8644125" y="2275444"/>
-            <a:ext cx="1285076" cy="1285076"/>
-          </a:xfrm>
-          <a:prstGeom prst="rect">
-            <a:avLst/>
-          </a:prstGeom>
-        </p:spPr>
-      </p:pic>
-      <p:sp>
-        <p:nvSpPr>
-          <p:cNvPr id="39" name="Rectángulo 38">
-            <a:extLst>
-              <a:ext uri="{FF2B5EF4-FFF2-40B4-BE49-F238E27FC236}">
-                <a16:creationId xmlns:a16="http://schemas.microsoft.com/office/drawing/2014/main" id="{FB394B3C-BAA0-436D-89FD-D4336A198C58}"/>
-              </a:ext>
-            </a:extLst>
-          </p:cNvPr>
-          <p:cNvSpPr/>
-          <p:nvPr/>
-        </p:nvSpPr>
-        <p:spPr>
-          <a:xfrm>
-            <a:off x="3745446" y="2450276"/>
+              <a:t>Piedras de obsidiana de la tierra  </a:t>
+            </a:r>
+          </a:p>
+        </p:txBody>
+      </p:sp>
+      <p:sp>
+        <p:nvSpPr>
+          <p:cNvPr id="41" name="Rectángulo 40">
+            <a:extLst>
+              <a:ext uri="{FF2B5EF4-FFF2-40B4-BE49-F238E27FC236}">
+                <a16:creationId xmlns:a16="http://schemas.microsoft.com/office/drawing/2014/main" id="{FE6211C8-9FB3-4AED-9D15-F5AFE22F8AF8}"/>
+              </a:ext>
+            </a:extLst>
+          </p:cNvPr>
+          <p:cNvSpPr/>
+          <p:nvPr/>
+        </p:nvSpPr>
+        <p:spPr>
+          <a:xfrm>
+            <a:off x="3828570" y="2062355"/>
             <a:ext cx="3133127" cy="338554"/>
           </a:xfrm>
           <a:prstGeom prst="rect">
@@ -15847,19 +15360,19 @@
       </p:sp>
       <p:sp>
         <p:nvSpPr>
-          <p:cNvPr id="40" name="Rectángulo: esquinas redondeadas 39">
-            <a:extLst>
-              <a:ext uri="{FF2B5EF4-FFF2-40B4-BE49-F238E27FC236}">
-                <a16:creationId xmlns:a16="http://schemas.microsoft.com/office/drawing/2014/main" id="{FBE2C1C0-A897-4573-98E7-48FF3F1BA549}"/>
-              </a:ext>
-            </a:extLst>
-          </p:cNvPr>
-          <p:cNvSpPr/>
-          <p:nvPr/>
-        </p:nvSpPr>
-        <p:spPr>
-          <a:xfrm>
-            <a:off x="5668904" y="2450109"/>
+          <p:cNvPr id="42" name="Rectángulo: esquinas redondeadas 41">
+            <a:extLst>
+              <a:ext uri="{FF2B5EF4-FFF2-40B4-BE49-F238E27FC236}">
+                <a16:creationId xmlns:a16="http://schemas.microsoft.com/office/drawing/2014/main" id="{272898C9-D0F9-4990-94FE-A8DEC7D895DD}"/>
+              </a:ext>
+            </a:extLst>
+          </p:cNvPr>
+          <p:cNvSpPr/>
+          <p:nvPr/>
+        </p:nvSpPr>
+        <p:spPr>
+          <a:xfrm>
+            <a:off x="5752028" y="2062188"/>
             <a:ext cx="1209669" cy="338554"/>
           </a:xfrm>
           <a:prstGeom prst="roundRect">
@@ -15907,10 +15420,10 @@
       </p:sp>
       <p:pic>
         <p:nvPicPr>
-          <p:cNvPr id="5122" name="Picture 2" descr="Iconos de la computadora lupa icono de diseño, lupa, vaso, texto, zona png  | PNGWing">
-            <a:extLst>
-              <a:ext uri="{FF2B5EF4-FFF2-40B4-BE49-F238E27FC236}">
-                <a16:creationId xmlns:a16="http://schemas.microsoft.com/office/drawing/2014/main" id="{E56EF8B9-1235-4565-8241-8722EF82C5FA}"/>
+          <p:cNvPr id="43" name="Picture 2" descr="Iconos de la computadora lupa icono de diseño, lupa, vaso, texto, zona png  | PNGWing">
+            <a:extLst>
+              <a:ext uri="{FF2B5EF4-FFF2-40B4-BE49-F238E27FC236}">
+                <a16:creationId xmlns:a16="http://schemas.microsoft.com/office/drawing/2014/main" id="{CCFB96F1-BC75-4ECB-BFC4-86FD9CA5FA9D}"/>
               </a:ext>
             </a:extLst>
           </p:cNvPr>
@@ -15945,7 +15458,7 @@
         </p:blipFill>
         <p:spPr bwMode="auto">
           <a:xfrm>
-            <a:off x="6604910" y="2506231"/>
+            <a:off x="6688034" y="2118310"/>
             <a:ext cx="222233" cy="219151"/>
           </a:xfrm>
           <a:prstGeom prst="rect">
@@ -15963,6 +15476,332 @@
           </a:extLst>
         </p:spPr>
       </p:pic>
+      <p:sp>
+        <p:nvSpPr>
+          <p:cNvPr id="46" name="Rectángulo 45">
+            <a:extLst>
+              <a:ext uri="{FF2B5EF4-FFF2-40B4-BE49-F238E27FC236}">
+                <a16:creationId xmlns:a16="http://schemas.microsoft.com/office/drawing/2014/main" id="{36C3EB07-DD8C-40CA-9FE0-BB44EC657A3F}"/>
+              </a:ext>
+            </a:extLst>
+          </p:cNvPr>
+          <p:cNvSpPr/>
+          <p:nvPr/>
+        </p:nvSpPr>
+        <p:spPr>
+          <a:xfrm>
+            <a:off x="8078512" y="5229294"/>
+            <a:ext cx="2171105" cy="338554"/>
+          </a:xfrm>
+          <a:prstGeom prst="rect">
+            <a:avLst/>
+          </a:prstGeom>
+          <a:noFill/>
+        </p:spPr>
+        <p:txBody>
+          <a:bodyPr wrap="square" lIns="91440" tIns="45720" rIns="91440" bIns="45720">
+            <a:spAutoFit/>
+          </a:bodyPr>
+          <a:lstStyle/>
+          <a:p>
+            <a:r>
+              <a:rPr lang="es-ES" sz="1600" b="1" cap="none" spc="0" dirty="0">
+                <a:ln w="0">
+                  <a:noFill/>
+                </a:ln>
+                <a:solidFill>
+                  <a:srgbClr val="3D4536"/>
+                </a:solidFill>
+                <a:effectLst>
+                  <a:outerShdw blurRad="38100" dist="38100" dir="2700000" algn="tl">
+                    <a:srgbClr val="000000">
+                      <a:alpha val="43137"/>
+                    </a:srgbClr>
+                  </a:outerShdw>
+                </a:effectLst>
+                <a:latin typeface="Copperplate Gothic Bold" panose="020E0705020206020404" pitchFamily="34" charset="0"/>
+              </a:rPr>
+              <a:t>Materiales:</a:t>
+            </a:r>
+          </a:p>
+        </p:txBody>
+      </p:sp>
+      <p:sp>
+        <p:nvSpPr>
+          <p:cNvPr id="47" name="Rectángulo: esquinas redondeadas 46">
+            <a:extLst>
+              <a:ext uri="{FF2B5EF4-FFF2-40B4-BE49-F238E27FC236}">
+                <a16:creationId xmlns:a16="http://schemas.microsoft.com/office/drawing/2014/main" id="{77DEC234-415A-4E11-BCD1-287352956022}"/>
+              </a:ext>
+            </a:extLst>
+          </p:cNvPr>
+          <p:cNvSpPr/>
+          <p:nvPr/>
+        </p:nvSpPr>
+        <p:spPr>
+          <a:xfrm>
+            <a:off x="9813436" y="5221681"/>
+            <a:ext cx="1419225" cy="357693"/>
+          </a:xfrm>
+          <a:prstGeom prst="roundRect">
+            <a:avLst/>
+          </a:prstGeom>
+          <a:solidFill>
+            <a:srgbClr val="025939"/>
+          </a:solidFill>
+          <a:ln>
+            <a:solidFill>
+              <a:srgbClr val="025939"/>
+            </a:solidFill>
+          </a:ln>
+        </p:spPr>
+        <p:style>
+          <a:lnRef idx="2">
+            <a:schemeClr val="accent1">
+              <a:shade val="50000"/>
+            </a:schemeClr>
+          </a:lnRef>
+          <a:fillRef idx="1">
+            <a:schemeClr val="accent1"/>
+          </a:fillRef>
+          <a:effectRef idx="0">
+            <a:schemeClr val="accent1"/>
+          </a:effectRef>
+          <a:fontRef idx="minor">
+            <a:schemeClr val="lt1"/>
+          </a:fontRef>
+        </p:style>
+        <p:txBody>
+          <a:bodyPr rtlCol="0" anchor="ctr"/>
+          <a:lstStyle/>
+          <a:p>
+            <a:pPr algn="ctr"/>
+            <a:r>
+              <a:rPr lang="es-419" sz="1200" dirty="0">
+                <a:solidFill>
+                  <a:srgbClr val="F2F2F2"/>
+                </a:solidFill>
+                <a:latin typeface="Copperplate Gothic Bold" panose="020E0705020206020404" pitchFamily="34" charset="0"/>
+              </a:rPr>
+              <a:t>Consultar</a:t>
+            </a:r>
+          </a:p>
+        </p:txBody>
+      </p:sp>
+      <p:sp>
+        <p:nvSpPr>
+          <p:cNvPr id="48" name="Rectángulo: esquinas redondeadas 47">
+            <a:extLst>
+              <a:ext uri="{FF2B5EF4-FFF2-40B4-BE49-F238E27FC236}">
+                <a16:creationId xmlns:a16="http://schemas.microsoft.com/office/drawing/2014/main" id="{54C4A984-9DCD-4719-BFD1-F70593E01629}"/>
+              </a:ext>
+            </a:extLst>
+          </p:cNvPr>
+          <p:cNvSpPr/>
+          <p:nvPr/>
+        </p:nvSpPr>
+        <p:spPr>
+          <a:xfrm>
+            <a:off x="9687670" y="2052779"/>
+            <a:ext cx="1347891" cy="338554"/>
+          </a:xfrm>
+          <a:prstGeom prst="roundRect">
+            <a:avLst>
+              <a:gd name="adj" fmla="val 5689"/>
+            </a:avLst>
+          </a:prstGeom>
+          <a:solidFill>
+            <a:schemeClr val="bg1"/>
+          </a:solidFill>
+          <a:ln>
+            <a:solidFill>
+              <a:srgbClr val="595948"/>
+            </a:solidFill>
+          </a:ln>
+        </p:spPr>
+        <p:style>
+          <a:lnRef idx="2">
+            <a:schemeClr val="accent1">
+              <a:shade val="50000"/>
+            </a:schemeClr>
+          </a:lnRef>
+          <a:fillRef idx="1">
+            <a:schemeClr val="accent1"/>
+          </a:fillRef>
+          <a:effectRef idx="0">
+            <a:schemeClr val="accent1"/>
+          </a:effectRef>
+          <a:fontRef idx="minor">
+            <a:schemeClr val="lt1"/>
+          </a:fontRef>
+        </p:style>
+        <p:txBody>
+          <a:bodyPr rtlCol="0" anchor="ctr"/>
+          <a:lstStyle/>
+          <a:p>
+            <a:endParaRPr lang="es-419" sz="1200" dirty="0">
+              <a:solidFill>
+                <a:srgbClr val="3D4536"/>
+              </a:solidFill>
+              <a:latin typeface="Copperplate Gothic Bold" panose="020E0705020206020404" pitchFamily="34" charset="0"/>
+            </a:endParaRPr>
+          </a:p>
+        </p:txBody>
+      </p:sp>
+      <p:sp>
+        <p:nvSpPr>
+          <p:cNvPr id="49" name="Rectángulo 48">
+            <a:extLst>
+              <a:ext uri="{FF2B5EF4-FFF2-40B4-BE49-F238E27FC236}">
+                <a16:creationId xmlns:a16="http://schemas.microsoft.com/office/drawing/2014/main" id="{171ED28F-45E6-4773-927E-679B2500EBF7}"/>
+              </a:ext>
+            </a:extLst>
+          </p:cNvPr>
+          <p:cNvSpPr/>
+          <p:nvPr/>
+        </p:nvSpPr>
+        <p:spPr>
+          <a:xfrm>
+            <a:off x="7161813" y="2058608"/>
+            <a:ext cx="3133127" cy="338554"/>
+          </a:xfrm>
+          <a:prstGeom prst="rect">
+            <a:avLst/>
+          </a:prstGeom>
+          <a:noFill/>
+        </p:spPr>
+        <p:txBody>
+          <a:bodyPr wrap="square" lIns="91440" tIns="45720" rIns="91440" bIns="45720">
+            <a:spAutoFit/>
+          </a:bodyPr>
+          <a:lstStyle/>
+          <a:p>
+            <a:r>
+              <a:rPr lang="es-ES" sz="1600" b="1" dirty="0">
+                <a:ln w="0">
+                  <a:solidFill>
+                    <a:schemeClr val="bg1">
+                      <a:lumMod val="50000"/>
+                    </a:schemeClr>
+                  </a:solidFill>
+                </a:ln>
+                <a:solidFill>
+                  <a:srgbClr val="F3EDED"/>
+                </a:solidFill>
+                <a:latin typeface="Copperplate Gothic Bold" panose="020E0705020206020404" pitchFamily="34" charset="0"/>
+              </a:rPr>
+              <a:t>Objeto a Consultar</a:t>
+            </a:r>
+            <a:endParaRPr lang="es-ES" sz="1600" b="1" cap="none" spc="0" dirty="0">
+              <a:ln w="0">
+                <a:solidFill>
+                  <a:schemeClr val="bg1">
+                    <a:lumMod val="50000"/>
+                  </a:schemeClr>
+                </a:solidFill>
+              </a:ln>
+              <a:solidFill>
+                <a:srgbClr val="F3EDED"/>
+              </a:solidFill>
+              <a:latin typeface="Copperplate Gothic Bold" panose="020E0705020206020404" pitchFamily="34" charset="0"/>
+            </a:endParaRPr>
+          </a:p>
+        </p:txBody>
+      </p:sp>
+      <p:sp>
+        <p:nvSpPr>
+          <p:cNvPr id="50" name="Triángulo isósceles 49">
+            <a:extLst>
+              <a:ext uri="{FF2B5EF4-FFF2-40B4-BE49-F238E27FC236}">
+                <a16:creationId xmlns:a16="http://schemas.microsoft.com/office/drawing/2014/main" id="{5A3D7361-FF51-42E3-A12A-8E46916876D8}"/>
+              </a:ext>
+            </a:extLst>
+          </p:cNvPr>
+          <p:cNvSpPr/>
+          <p:nvPr/>
+        </p:nvSpPr>
+        <p:spPr>
+          <a:xfrm rot="10800000">
+            <a:off x="10822782" y="2155818"/>
+            <a:ext cx="152400" cy="162490"/>
+          </a:xfrm>
+          <a:prstGeom prst="triangle">
+            <a:avLst/>
+          </a:prstGeom>
+          <a:solidFill>
+            <a:srgbClr val="F3EDED"/>
+          </a:solidFill>
+          <a:ln>
+            <a:solidFill>
+              <a:srgbClr val="595948"/>
+            </a:solidFill>
+          </a:ln>
+        </p:spPr>
+        <p:style>
+          <a:lnRef idx="2">
+            <a:schemeClr val="accent1">
+              <a:shade val="50000"/>
+            </a:schemeClr>
+          </a:lnRef>
+          <a:fillRef idx="1">
+            <a:schemeClr val="accent1"/>
+          </a:fillRef>
+          <a:effectRef idx="0">
+            <a:schemeClr val="accent1"/>
+          </a:effectRef>
+          <a:fontRef idx="minor">
+            <a:schemeClr val="lt1"/>
+          </a:fontRef>
+        </p:style>
+        <p:txBody>
+          <a:bodyPr rtlCol="0" anchor="ctr"/>
+          <a:lstStyle/>
+          <a:p>
+            <a:pPr algn="ctr"/>
+            <a:endParaRPr lang="es-419"/>
+          </a:p>
+        </p:txBody>
+      </p:sp>
+      <p:sp>
+        <p:nvSpPr>
+          <p:cNvPr id="51" name="CuadroTexto 50">
+            <a:extLst>
+              <a:ext uri="{FF2B5EF4-FFF2-40B4-BE49-F238E27FC236}">
+                <a16:creationId xmlns:a16="http://schemas.microsoft.com/office/drawing/2014/main" id="{5425A41E-A7C3-4088-B3A3-387E4872989F}"/>
+              </a:ext>
+            </a:extLst>
+          </p:cNvPr>
+          <p:cNvSpPr txBox="1"/>
+          <p:nvPr/>
+        </p:nvSpPr>
+        <p:spPr>
+          <a:xfrm>
+            <a:off x="9687670" y="2083613"/>
+            <a:ext cx="1037053" cy="276999"/>
+          </a:xfrm>
+          <a:prstGeom prst="rect">
+            <a:avLst/>
+          </a:prstGeom>
+          <a:noFill/>
+        </p:spPr>
+        <p:txBody>
+          <a:bodyPr wrap="square">
+            <a:spAutoFit/>
+          </a:bodyPr>
+          <a:lstStyle/>
+          <a:p>
+            <a:r>
+              <a:rPr lang="es-419" sz="1200" dirty="0">
+                <a:solidFill>
+                  <a:srgbClr val="3D4536"/>
+                </a:solidFill>
+                <a:latin typeface="Copperplate Gothic Bold" panose="020E0705020206020404" pitchFamily="34" charset="0"/>
+              </a:rPr>
+              <a:t>Material</a:t>
+            </a:r>
+          </a:p>
+        </p:txBody>
+      </p:sp>
     </p:spTree>
     <p:extLst>
       <p:ext uri="{BB962C8B-B14F-4D97-AF65-F5344CB8AC3E}">
@@ -16181,68 +16020,6 @@
       </p:sp>
       <p:sp>
         <p:nvSpPr>
-          <p:cNvPr id="5" name="Rectángulo: esquinas redondeadas 4">
-            <a:extLst>
-              <a:ext uri="{FF2B5EF4-FFF2-40B4-BE49-F238E27FC236}">
-                <a16:creationId xmlns:a16="http://schemas.microsoft.com/office/drawing/2014/main" id="{186543CC-FD38-446A-BE03-F1F8902C35FA}"/>
-              </a:ext>
-            </a:extLst>
-          </p:cNvPr>
-          <p:cNvSpPr/>
-          <p:nvPr/>
-        </p:nvSpPr>
-        <p:spPr>
-          <a:xfrm>
-            <a:off x="-3" y="4362450"/>
-            <a:ext cx="2733675" cy="523786"/>
-          </a:xfrm>
-          <a:prstGeom prst="roundRect">
-            <a:avLst>
-              <a:gd name="adj" fmla="val 0"/>
-            </a:avLst>
-          </a:prstGeom>
-          <a:noFill/>
-          <a:ln>
-            <a:solidFill>
-              <a:srgbClr val="595948"/>
-            </a:solidFill>
-          </a:ln>
-        </p:spPr>
-        <p:style>
-          <a:lnRef idx="2">
-            <a:schemeClr val="accent1">
-              <a:shade val="50000"/>
-            </a:schemeClr>
-          </a:lnRef>
-          <a:fillRef idx="1">
-            <a:schemeClr val="accent1"/>
-          </a:fillRef>
-          <a:effectRef idx="0">
-            <a:schemeClr val="accent1"/>
-          </a:effectRef>
-          <a:fontRef idx="minor">
-            <a:schemeClr val="lt1"/>
-          </a:fontRef>
-        </p:style>
-        <p:txBody>
-          <a:bodyPr rtlCol="0" anchor="ctr"/>
-          <a:lstStyle/>
-          <a:p>
-            <a:pPr algn="ctr"/>
-            <a:r>
-              <a:rPr lang="es-419" sz="1600" dirty="0">
-                <a:solidFill>
-                  <a:srgbClr val="595948"/>
-                </a:solidFill>
-                <a:latin typeface="Copperplate Gothic Bold" panose="020E0705020206020404" pitchFamily="34" charset="0"/>
-              </a:rPr>
-              <a:t>Consultar Producto</a:t>
-            </a:r>
-          </a:p>
-        </p:txBody>
-      </p:sp>
-      <p:sp>
-        <p:nvSpPr>
           <p:cNvPr id="6" name="Rectángulo: esquinas redondeadas 5">
             <a:extLst>
               <a:ext uri="{FF2B5EF4-FFF2-40B4-BE49-F238E27FC236}">
@@ -16354,7 +16131,7 @@
                 </a:effectLst>
                 <a:latin typeface="Copperplate Gothic Bold" panose="020E0705020206020404" pitchFamily="34" charset="0"/>
               </a:rPr>
-              <a:t>Consultar Material</a:t>
+              <a:t>Consultar Objeto</a:t>
             </a:r>
           </a:p>
         </p:txBody>
@@ -16687,7 +16464,7 @@
         </p:blipFill>
         <p:spPr>
           <a:xfrm>
-            <a:off x="8276030" y="2429821"/>
+            <a:off x="8209355" y="2429821"/>
             <a:ext cx="2956631" cy="2639849"/>
           </a:xfrm>
           <a:prstGeom prst="rect">
@@ -17037,7 +16814,7 @@
         </p:blipFill>
         <p:spPr>
           <a:xfrm>
-            <a:off x="8429595" y="2871301"/>
+            <a:off x="8362920" y="2871301"/>
             <a:ext cx="2660966" cy="1689053"/>
           </a:xfrm>
           <a:prstGeom prst="rect">
@@ -17107,6 +16884,332 @@
                 <a:latin typeface="Copperplate Gothic Bold" panose="020E0705020206020404" pitchFamily="34" charset="0"/>
               </a:rPr>
               <a:t>Venezuela</a:t>
+            </a:r>
+          </a:p>
+        </p:txBody>
+      </p:sp>
+      <p:sp>
+        <p:nvSpPr>
+          <p:cNvPr id="21" name="Rectángulo 20">
+            <a:extLst>
+              <a:ext uri="{FF2B5EF4-FFF2-40B4-BE49-F238E27FC236}">
+                <a16:creationId xmlns:a16="http://schemas.microsoft.com/office/drawing/2014/main" id="{7EB2CBC4-2F32-4E91-80C4-37BBF3705201}"/>
+              </a:ext>
+            </a:extLst>
+          </p:cNvPr>
+          <p:cNvSpPr/>
+          <p:nvPr/>
+        </p:nvSpPr>
+        <p:spPr>
+          <a:xfrm>
+            <a:off x="8078512" y="5153094"/>
+            <a:ext cx="2171105" cy="338554"/>
+          </a:xfrm>
+          <a:prstGeom prst="rect">
+            <a:avLst/>
+          </a:prstGeom>
+          <a:noFill/>
+        </p:spPr>
+        <p:txBody>
+          <a:bodyPr wrap="square" lIns="91440" tIns="45720" rIns="91440" bIns="45720">
+            <a:spAutoFit/>
+          </a:bodyPr>
+          <a:lstStyle/>
+          <a:p>
+            <a:r>
+              <a:rPr lang="es-ES" sz="1600" b="1" cap="none" spc="0" dirty="0">
+                <a:ln w="0">
+                  <a:noFill/>
+                </a:ln>
+                <a:solidFill>
+                  <a:srgbClr val="3D4536"/>
+                </a:solidFill>
+                <a:effectLst>
+                  <a:outerShdw blurRad="38100" dist="38100" dir="2700000" algn="tl">
+                    <a:srgbClr val="000000">
+                      <a:alpha val="43137"/>
+                    </a:srgbClr>
+                  </a:outerShdw>
+                </a:effectLst>
+                <a:latin typeface="Copperplate Gothic Bold" panose="020E0705020206020404" pitchFamily="34" charset="0"/>
+              </a:rPr>
+              <a:t>Materiales:</a:t>
+            </a:r>
+          </a:p>
+        </p:txBody>
+      </p:sp>
+      <p:sp>
+        <p:nvSpPr>
+          <p:cNvPr id="22" name="Rectángulo: esquinas redondeadas 21">
+            <a:extLst>
+              <a:ext uri="{FF2B5EF4-FFF2-40B4-BE49-F238E27FC236}">
+                <a16:creationId xmlns:a16="http://schemas.microsoft.com/office/drawing/2014/main" id="{84AF08F5-36D5-4B1D-BF40-ADB8FCDF1093}"/>
+              </a:ext>
+            </a:extLst>
+          </p:cNvPr>
+          <p:cNvSpPr/>
+          <p:nvPr/>
+        </p:nvSpPr>
+        <p:spPr>
+          <a:xfrm>
+            <a:off x="9813436" y="5145481"/>
+            <a:ext cx="1419225" cy="357693"/>
+          </a:xfrm>
+          <a:prstGeom prst="roundRect">
+            <a:avLst/>
+          </a:prstGeom>
+          <a:solidFill>
+            <a:srgbClr val="025939"/>
+          </a:solidFill>
+          <a:ln>
+            <a:solidFill>
+              <a:srgbClr val="025939"/>
+            </a:solidFill>
+          </a:ln>
+        </p:spPr>
+        <p:style>
+          <a:lnRef idx="2">
+            <a:schemeClr val="accent1">
+              <a:shade val="50000"/>
+            </a:schemeClr>
+          </a:lnRef>
+          <a:fillRef idx="1">
+            <a:schemeClr val="accent1"/>
+          </a:fillRef>
+          <a:effectRef idx="0">
+            <a:schemeClr val="accent1"/>
+          </a:effectRef>
+          <a:fontRef idx="minor">
+            <a:schemeClr val="lt1"/>
+          </a:fontRef>
+        </p:style>
+        <p:txBody>
+          <a:bodyPr rtlCol="0" anchor="ctr"/>
+          <a:lstStyle/>
+          <a:p>
+            <a:pPr algn="ctr"/>
+            <a:r>
+              <a:rPr lang="es-419" sz="1200" dirty="0">
+                <a:solidFill>
+                  <a:srgbClr val="F2F2F2"/>
+                </a:solidFill>
+                <a:latin typeface="Copperplate Gothic Bold" panose="020E0705020206020404" pitchFamily="34" charset="0"/>
+              </a:rPr>
+              <a:t>Consultar</a:t>
+            </a:r>
+          </a:p>
+        </p:txBody>
+      </p:sp>
+      <p:sp>
+        <p:nvSpPr>
+          <p:cNvPr id="23" name="Rectángulo: esquinas redondeadas 22">
+            <a:extLst>
+              <a:ext uri="{FF2B5EF4-FFF2-40B4-BE49-F238E27FC236}">
+                <a16:creationId xmlns:a16="http://schemas.microsoft.com/office/drawing/2014/main" id="{6D7F99C5-EE66-49AC-9564-0B0B8D116399}"/>
+              </a:ext>
+            </a:extLst>
+          </p:cNvPr>
+          <p:cNvSpPr/>
+          <p:nvPr/>
+        </p:nvSpPr>
+        <p:spPr>
+          <a:xfrm>
+            <a:off x="9687670" y="2052779"/>
+            <a:ext cx="1347891" cy="338554"/>
+          </a:xfrm>
+          <a:prstGeom prst="roundRect">
+            <a:avLst>
+              <a:gd name="adj" fmla="val 5689"/>
+            </a:avLst>
+          </a:prstGeom>
+          <a:solidFill>
+            <a:schemeClr val="bg1"/>
+          </a:solidFill>
+          <a:ln>
+            <a:solidFill>
+              <a:srgbClr val="595948"/>
+            </a:solidFill>
+          </a:ln>
+        </p:spPr>
+        <p:style>
+          <a:lnRef idx="2">
+            <a:schemeClr val="accent1">
+              <a:shade val="50000"/>
+            </a:schemeClr>
+          </a:lnRef>
+          <a:fillRef idx="1">
+            <a:schemeClr val="accent1"/>
+          </a:fillRef>
+          <a:effectRef idx="0">
+            <a:schemeClr val="accent1"/>
+          </a:effectRef>
+          <a:fontRef idx="minor">
+            <a:schemeClr val="lt1"/>
+          </a:fontRef>
+        </p:style>
+        <p:txBody>
+          <a:bodyPr rtlCol="0" anchor="ctr"/>
+          <a:lstStyle/>
+          <a:p>
+            <a:endParaRPr lang="es-419" sz="1200" dirty="0">
+              <a:solidFill>
+                <a:srgbClr val="3D4536"/>
+              </a:solidFill>
+              <a:latin typeface="Copperplate Gothic Bold" panose="020E0705020206020404" pitchFamily="34" charset="0"/>
+            </a:endParaRPr>
+          </a:p>
+        </p:txBody>
+      </p:sp>
+      <p:sp>
+        <p:nvSpPr>
+          <p:cNvPr id="26" name="Rectángulo 25">
+            <a:extLst>
+              <a:ext uri="{FF2B5EF4-FFF2-40B4-BE49-F238E27FC236}">
+                <a16:creationId xmlns:a16="http://schemas.microsoft.com/office/drawing/2014/main" id="{F0EC99D8-A0E3-4232-9382-36C4F0FDC1F8}"/>
+              </a:ext>
+            </a:extLst>
+          </p:cNvPr>
+          <p:cNvSpPr/>
+          <p:nvPr/>
+        </p:nvSpPr>
+        <p:spPr>
+          <a:xfrm>
+            <a:off x="7161813" y="2058608"/>
+            <a:ext cx="3133127" cy="338554"/>
+          </a:xfrm>
+          <a:prstGeom prst="rect">
+            <a:avLst/>
+          </a:prstGeom>
+          <a:noFill/>
+        </p:spPr>
+        <p:txBody>
+          <a:bodyPr wrap="square" lIns="91440" tIns="45720" rIns="91440" bIns="45720">
+            <a:spAutoFit/>
+          </a:bodyPr>
+          <a:lstStyle/>
+          <a:p>
+            <a:r>
+              <a:rPr lang="es-ES" sz="1600" b="1" dirty="0">
+                <a:ln w="0">
+                  <a:solidFill>
+                    <a:schemeClr val="bg1">
+                      <a:lumMod val="50000"/>
+                    </a:schemeClr>
+                  </a:solidFill>
+                </a:ln>
+                <a:solidFill>
+                  <a:srgbClr val="F3EDED"/>
+                </a:solidFill>
+                <a:latin typeface="Copperplate Gothic Bold" panose="020E0705020206020404" pitchFamily="34" charset="0"/>
+              </a:rPr>
+              <a:t>Objeto a Consultar</a:t>
+            </a:r>
+            <a:endParaRPr lang="es-ES" sz="1600" b="1" cap="none" spc="0" dirty="0">
+              <a:ln w="0">
+                <a:solidFill>
+                  <a:schemeClr val="bg1">
+                    <a:lumMod val="50000"/>
+                  </a:schemeClr>
+                </a:solidFill>
+              </a:ln>
+              <a:solidFill>
+                <a:srgbClr val="F3EDED"/>
+              </a:solidFill>
+              <a:latin typeface="Copperplate Gothic Bold" panose="020E0705020206020404" pitchFamily="34" charset="0"/>
+            </a:endParaRPr>
+          </a:p>
+        </p:txBody>
+      </p:sp>
+      <p:sp>
+        <p:nvSpPr>
+          <p:cNvPr id="9" name="Triángulo isósceles 8">
+            <a:extLst>
+              <a:ext uri="{FF2B5EF4-FFF2-40B4-BE49-F238E27FC236}">
+                <a16:creationId xmlns:a16="http://schemas.microsoft.com/office/drawing/2014/main" id="{8A8477D1-4FB9-4DA0-B2FF-014A095ABFF7}"/>
+              </a:ext>
+            </a:extLst>
+          </p:cNvPr>
+          <p:cNvSpPr/>
+          <p:nvPr/>
+        </p:nvSpPr>
+        <p:spPr>
+          <a:xfrm rot="10800000">
+            <a:off x="10822782" y="2155818"/>
+            <a:ext cx="152400" cy="162490"/>
+          </a:xfrm>
+          <a:prstGeom prst="triangle">
+            <a:avLst/>
+          </a:prstGeom>
+          <a:solidFill>
+            <a:srgbClr val="F3EDED"/>
+          </a:solidFill>
+          <a:ln>
+            <a:solidFill>
+              <a:srgbClr val="595948"/>
+            </a:solidFill>
+          </a:ln>
+        </p:spPr>
+        <p:style>
+          <a:lnRef idx="2">
+            <a:schemeClr val="accent1">
+              <a:shade val="50000"/>
+            </a:schemeClr>
+          </a:lnRef>
+          <a:fillRef idx="1">
+            <a:schemeClr val="accent1"/>
+          </a:fillRef>
+          <a:effectRef idx="0">
+            <a:schemeClr val="accent1"/>
+          </a:effectRef>
+          <a:fontRef idx="minor">
+            <a:schemeClr val="lt1"/>
+          </a:fontRef>
+        </p:style>
+        <p:txBody>
+          <a:bodyPr rtlCol="0" anchor="ctr"/>
+          <a:lstStyle/>
+          <a:p>
+            <a:pPr algn="ctr"/>
+            <a:endParaRPr lang="es-419"/>
+          </a:p>
+        </p:txBody>
+      </p:sp>
+      <p:sp>
+        <p:nvSpPr>
+          <p:cNvPr id="27" name="CuadroTexto 26">
+            <a:extLst>
+              <a:ext uri="{FF2B5EF4-FFF2-40B4-BE49-F238E27FC236}">
+                <a16:creationId xmlns:a16="http://schemas.microsoft.com/office/drawing/2014/main" id="{0D387E90-F872-4698-B471-359BE9AFEFD9}"/>
+              </a:ext>
+            </a:extLst>
+          </p:cNvPr>
+          <p:cNvSpPr txBox="1"/>
+          <p:nvPr/>
+        </p:nvSpPr>
+        <p:spPr>
+          <a:xfrm>
+            <a:off x="9687670" y="2083613"/>
+            <a:ext cx="1037053" cy="276999"/>
+          </a:xfrm>
+          <a:prstGeom prst="rect">
+            <a:avLst/>
+          </a:prstGeom>
+          <a:noFill/>
+        </p:spPr>
+        <p:txBody>
+          <a:bodyPr wrap="square">
+            <a:spAutoFit/>
+          </a:bodyPr>
+          <a:lstStyle/>
+          <a:p>
+            <a:r>
+              <a:rPr lang="es-419" sz="1200" dirty="0">
+                <a:solidFill>
+                  <a:srgbClr val="3D4536"/>
+                </a:solidFill>
+                <a:latin typeface="Copperplate Gothic Bold" panose="020E0705020206020404" pitchFamily="34" charset="0"/>
+              </a:rPr>
+              <a:t>Material</a:t>
             </a:r>
           </a:p>
         </p:txBody>

</xml_diff>